<commit_message>
Adding custom transitions examples
</commit_message>
<xml_diff>
--- a/Smooth transitions.pptx
+++ b/Smooth transitions.pptx
@@ -79,7 +79,7 @@
         <a:sym typeface="Calibri"/>
       </a:defRPr>
     </a:lvl1pPr>
-    <a:lvl2pPr marL="0" marR="0" indent="457200" algn="l" defTabSz="457200" rtl="0" fontAlgn="auto" latinLnBrk="0" hangingPunct="0">
+    <a:lvl2pPr marL="0" marR="0" indent="0" algn="l" defTabSz="457200" rtl="0" fontAlgn="auto" latinLnBrk="0" hangingPunct="0">
       <a:lnSpc>
         <a:spcPct val="100000"/>
       </a:lnSpc>
@@ -109,7 +109,7 @@
         <a:sym typeface="Calibri"/>
       </a:defRPr>
     </a:lvl2pPr>
-    <a:lvl3pPr marL="0" marR="0" indent="914400" algn="l" defTabSz="457200" rtl="0" fontAlgn="auto" latinLnBrk="0" hangingPunct="0">
+    <a:lvl3pPr marL="0" marR="0" indent="0" algn="l" defTabSz="457200" rtl="0" fontAlgn="auto" latinLnBrk="0" hangingPunct="0">
       <a:lnSpc>
         <a:spcPct val="100000"/>
       </a:lnSpc>
@@ -139,7 +139,7 @@
         <a:sym typeface="Calibri"/>
       </a:defRPr>
     </a:lvl3pPr>
-    <a:lvl4pPr marL="0" marR="0" indent="1371600" algn="l" defTabSz="457200" rtl="0" fontAlgn="auto" latinLnBrk="0" hangingPunct="0">
+    <a:lvl4pPr marL="0" marR="0" indent="0" algn="l" defTabSz="457200" rtl="0" fontAlgn="auto" latinLnBrk="0" hangingPunct="0">
       <a:lnSpc>
         <a:spcPct val="100000"/>
       </a:lnSpc>
@@ -169,7 +169,7 @@
         <a:sym typeface="Calibri"/>
       </a:defRPr>
     </a:lvl4pPr>
-    <a:lvl5pPr marL="0" marR="0" indent="1828800" algn="l" defTabSz="457200" rtl="0" fontAlgn="auto" latinLnBrk="0" hangingPunct="0">
+    <a:lvl5pPr marL="0" marR="0" indent="0" algn="l" defTabSz="457200" rtl="0" fontAlgn="auto" latinLnBrk="0" hangingPunct="0">
       <a:lnSpc>
         <a:spcPct val="100000"/>
       </a:lnSpc>
@@ -199,7 +199,7 @@
         <a:sym typeface="Calibri"/>
       </a:defRPr>
     </a:lvl5pPr>
-    <a:lvl6pPr marL="0" marR="0" indent="2286000" algn="l" defTabSz="457200" rtl="0" fontAlgn="auto" latinLnBrk="0" hangingPunct="0">
+    <a:lvl6pPr marL="0" marR="0" indent="0" algn="l" defTabSz="457200" rtl="0" fontAlgn="auto" latinLnBrk="0" hangingPunct="0">
       <a:lnSpc>
         <a:spcPct val="100000"/>
       </a:lnSpc>
@@ -229,7 +229,7 @@
         <a:sym typeface="Calibri"/>
       </a:defRPr>
     </a:lvl6pPr>
-    <a:lvl7pPr marL="0" marR="0" indent="2743200" algn="l" defTabSz="457200" rtl="0" fontAlgn="auto" latinLnBrk="0" hangingPunct="0">
+    <a:lvl7pPr marL="0" marR="0" indent="0" algn="l" defTabSz="457200" rtl="0" fontAlgn="auto" latinLnBrk="0" hangingPunct="0">
       <a:lnSpc>
         <a:spcPct val="100000"/>
       </a:lnSpc>
@@ -259,7 +259,7 @@
         <a:sym typeface="Calibri"/>
       </a:defRPr>
     </a:lvl7pPr>
-    <a:lvl8pPr marL="0" marR="0" indent="3200400" algn="l" defTabSz="457200" rtl="0" fontAlgn="auto" latinLnBrk="0" hangingPunct="0">
+    <a:lvl8pPr marL="0" marR="0" indent="0" algn="l" defTabSz="457200" rtl="0" fontAlgn="auto" latinLnBrk="0" hangingPunct="0">
       <a:lnSpc>
         <a:spcPct val="100000"/>
       </a:lnSpc>
@@ -289,7 +289,7 @@
         <a:sym typeface="Calibri"/>
       </a:defRPr>
     </a:lvl8pPr>
-    <a:lvl9pPr marL="0" marR="0" indent="3657600" algn="l" defTabSz="457200" rtl="0" fontAlgn="auto" latinLnBrk="0" hangingPunct="0">
+    <a:lvl9pPr marL="0" marR="0" indent="0" algn="l" defTabSz="457200" rtl="0" fontAlgn="auto" latinLnBrk="0" hangingPunct="0">
       <a:lnSpc>
         <a:spcPct val="100000"/>
       </a:lnSpc>
@@ -550,7 +550,7 @@
         <p:spPr>
           <a:xfrm>
             <a:off x="1354137" y="4341762"/>
-            <a:ext cx="9483726" cy="415926"/>
+            <a:ext cx="9483726" cy="415927"/>
           </a:xfrm>
           <a:prstGeom prst="rect">
             <a:avLst/>
@@ -581,8 +581,8 @@
         </p:nvSpPr>
         <p:spPr>
           <a:xfrm>
-            <a:off x="3189396" y="2145048"/>
-            <a:ext cx="3873501" cy="230833"/>
+            <a:off x="3189395" y="2145047"/>
+            <a:ext cx="3873503" cy="230834"/>
           </a:xfrm>
           <a:prstGeom prst="rect">
             <a:avLst/>
@@ -595,7 +595,7 @@
               <a:spcBef>
                 <a:spcPts val="900"/>
               </a:spcBef>
-              <a:defRPr b="0" sz="939"/>
+              <a:defRPr b="0" sz="900"/>
             </a:lvl1pPr>
           </a:lstStyle>
           <a:p>
@@ -617,14 +617,14 @@
         <p:spPr>
           <a:xfrm>
             <a:off x="1382703" y="1344842"/>
-            <a:ext cx="1488089" cy="1415443"/>
+            <a:ext cx="1488090" cy="1415444"/>
           </a:xfrm>
           <a:prstGeom prst="rect">
             <a:avLst/>
           </a:prstGeom>
         </p:spPr>
         <p:txBody>
-          <a:bodyPr lIns="91439" rIns="91439">
+          <a:bodyPr lIns="91439" tIns="45719" rIns="91439" bIns="45719">
             <a:noAutofit/>
           </a:bodyPr>
           <a:lstStyle/>
@@ -706,7 +706,7 @@
           </a:ln>
         </p:spPr>
         <p:txBody>
-          <a:bodyPr lIns="45719" rIns="45719" anchor="ctr"/>
+          <a:bodyPr lIns="45718" tIns="45718" rIns="45718" bIns="45718" anchor="ctr"/>
           <a:lstStyle/>
           <a:p>
             <a:pPr algn="ctr">
@@ -727,10 +727,10 @@
         </p:nvGrpSpPr>
         <p:grpSpPr>
           <a:xfrm>
-            <a:off x="235973" y="216310"/>
-            <a:ext cx="11729886" cy="5801034"/>
+            <a:off x="235973" y="216309"/>
+            <a:ext cx="11729888" cy="5801036"/>
             <a:chOff x="0" y="0"/>
-            <a:chExt cx="11729884" cy="5801033"/>
+            <a:chExt cx="11729887" cy="5801035"/>
           </a:xfrm>
         </p:grpSpPr>
         <p:sp>
@@ -741,8 +741,8 @@
           </p:nvSpPr>
           <p:spPr>
             <a:xfrm>
-              <a:off x="0" y="0"/>
-              <a:ext cx="11729885" cy="5801034"/>
+              <a:off x="0" y="-1"/>
+              <a:ext cx="11729888" cy="5801036"/>
             </a:xfrm>
             <a:prstGeom prst="roundRect">
               <a:avLst>
@@ -759,7 +759,7 @@
             <a:effectLst/>
           </p:spPr>
           <p:txBody>
-            <a:bodyPr wrap="square" lIns="45719" tIns="45719" rIns="45719" bIns="45719" numCol="1" anchor="ctr">
+            <a:bodyPr wrap="square" lIns="45718" tIns="45718" rIns="45718" bIns="45718" numCol="1" anchor="ctr">
               <a:noAutofit/>
             </a:bodyPr>
             <a:lstStyle/>
@@ -782,8 +782,8 @@
           </p:nvSpPr>
           <p:spPr>
             <a:xfrm>
-              <a:off x="94176" y="2733972"/>
-              <a:ext cx="11541532" cy="333089"/>
+              <a:off x="94175" y="2733972"/>
+              <a:ext cx="11541536" cy="333086"/>
             </a:xfrm>
             <a:prstGeom prst="rect">
               <a:avLst/>
@@ -801,7 +801,7 @@
             </a:extLst>
           </p:spPr>
           <p:txBody>
-            <a:bodyPr wrap="square" lIns="45719" tIns="45719" rIns="45719" bIns="45719" numCol="1" anchor="ctr">
+            <a:bodyPr wrap="square" lIns="45718" tIns="45718" rIns="45718" bIns="45718" numCol="1" anchor="ctr">
               <a:spAutoFit/>
             </a:bodyPr>
             <a:lstStyle>
@@ -831,7 +831,7 @@
         <p:spPr>
           <a:xfrm>
             <a:off x="7516741" y="604324"/>
-            <a:ext cx="4080967" cy="5031089"/>
+            <a:ext cx="4080968" cy="5031090"/>
           </a:xfrm>
           <a:prstGeom prst="roundRect">
             <a:avLst>
@@ -853,7 +853,7 @@
           </a:effectLst>
         </p:spPr>
         <p:txBody>
-          <a:bodyPr lIns="45719" rIns="45719" anchor="ctr"/>
+          <a:bodyPr lIns="45718" tIns="45718" rIns="45718" bIns="45718" anchor="ctr"/>
           <a:lstStyle/>
           <a:p>
             <a:pPr algn="ctr">
@@ -877,7 +877,7 @@
         <p:spPr>
           <a:xfrm>
             <a:off x="1360556" y="1459723"/>
-            <a:ext cx="4598068" cy="1754328"/>
+            <a:ext cx="4598069" cy="1754329"/>
           </a:xfrm>
           <a:prstGeom prst="rect">
             <a:avLst/>
@@ -929,7 +929,7 @@
         <p:spPr>
           <a:xfrm>
             <a:off x="1354138" y="4042171"/>
-            <a:ext cx="3772009" cy="585247"/>
+            <a:ext cx="3772009" cy="585248"/>
           </a:xfrm>
           <a:prstGeom prst="rect">
             <a:avLst/>
@@ -942,7 +942,7 @@
               <a:spcBef>
                 <a:spcPts val="900"/>
               </a:spcBef>
-              <a:defRPr b="0" spc="91" sz="1656"/>
+              <a:defRPr b="0" sz="1600"/>
             </a:lvl1pPr>
           </a:lstStyle>
           <a:p>
@@ -964,14 +964,14 @@
         <p:spPr>
           <a:xfrm>
             <a:off x="7602934" y="685681"/>
-            <a:ext cx="3901733" cy="4840477"/>
+            <a:ext cx="3901734" cy="4840478"/>
           </a:xfrm>
           <a:prstGeom prst="rect">
             <a:avLst/>
           </a:prstGeom>
         </p:spPr>
         <p:txBody>
-          <a:bodyPr lIns="91439" rIns="91439">
+          <a:bodyPr lIns="91439" tIns="45719" rIns="91439" bIns="45719">
             <a:noAutofit/>
           </a:bodyPr>
           <a:lstStyle/>
@@ -999,8 +999,8 @@
         </p:blipFill>
         <p:spPr>
           <a:xfrm>
-            <a:off x="469638" y="5702144"/>
-            <a:ext cx="4656509" cy="1155856"/>
+            <a:off x="469638" y="5702143"/>
+            <a:ext cx="4656510" cy="1155857"/>
           </a:xfrm>
           <a:prstGeom prst="rect">
             <a:avLst/>
@@ -1018,10 +1018,10 @@
         </p:nvGrpSpPr>
         <p:grpSpPr>
           <a:xfrm>
-            <a:off x="5859703" y="6177667"/>
-            <a:ext cx="6129099" cy="490692"/>
-            <a:chOff x="0" y="0"/>
-            <a:chExt cx="6129097" cy="490690"/>
+            <a:off x="5859699" y="6177667"/>
+            <a:ext cx="6129106" cy="490696"/>
+            <a:chOff x="-3" y="0"/>
+            <a:chExt cx="6129104" cy="490695"/>
           </a:xfrm>
         </p:grpSpPr>
         <p:grpSp>
@@ -1032,10 +1032,10 @@
           </p:nvGrpSpPr>
           <p:grpSpPr>
             <a:xfrm>
-              <a:off x="-1" y="0"/>
-              <a:ext cx="6129099" cy="490691"/>
-              <a:chOff x="0" y="0"/>
-              <a:chExt cx="6129097" cy="490690"/>
+              <a:off x="-4" y="-1"/>
+              <a:ext cx="6129106" cy="490696"/>
+              <a:chOff x="-2" y="0"/>
+              <a:chExt cx="6129104" cy="490695"/>
             </a:xfrm>
           </p:grpSpPr>
           <p:grpSp>
@@ -1046,10 +1046,10 @@
             </p:nvGrpSpPr>
             <p:grpSpPr>
               <a:xfrm>
-                <a:off x="-1" y="0"/>
-                <a:ext cx="6129099" cy="490691"/>
+                <a:off x="-3" y="0"/>
+                <a:ext cx="6129106" cy="490696"/>
                 <a:chOff x="0" y="0"/>
-                <a:chExt cx="6129098" cy="490690"/>
+                <a:chExt cx="6129104" cy="490694"/>
               </a:xfrm>
             </p:grpSpPr>
             <p:sp>
@@ -1060,8 +1060,8 @@
               </p:nvSpPr>
               <p:spPr>
                 <a:xfrm>
-                  <a:off x="236297" y="0"/>
-                  <a:ext cx="5892801" cy="472594"/>
+                  <a:off x="236297" y="-1"/>
+                  <a:ext cx="5892807" cy="472599"/>
                 </a:xfrm>
                 <a:prstGeom prst="roundRect">
                   <a:avLst>
@@ -1078,7 +1078,7 @@
                 <a:effectLst/>
               </p:spPr>
               <p:txBody>
-                <a:bodyPr wrap="square" lIns="45719" tIns="45719" rIns="45719" bIns="45719" numCol="1" anchor="ctr">
+                <a:bodyPr wrap="square" lIns="45718" tIns="45718" rIns="45718" bIns="45718" numCol="1" anchor="ctr">
                   <a:noAutofit/>
                 </a:bodyPr>
                 <a:lstStyle/>
@@ -1102,7 +1102,7 @@
               <p:spPr>
                 <a:xfrm>
                   <a:off x="484857" y="75856"/>
-                  <a:ext cx="4875293" cy="294641"/>
+                  <a:ext cx="4875299" cy="294639"/>
                 </a:xfrm>
                 <a:prstGeom prst="rect">
                   <a:avLst/>
@@ -1120,7 +1120,7 @@
                 </a:extLst>
               </p:spPr>
               <p:txBody>
-                <a:bodyPr wrap="square" lIns="45719" tIns="45719" rIns="45719" bIns="45719" numCol="1" anchor="t">
+                <a:bodyPr wrap="square" lIns="45718" tIns="45718" rIns="45718" bIns="45718" numCol="1" anchor="t">
                   <a:spAutoFit/>
                 </a:bodyPr>
                 <a:lstStyle/>
@@ -1140,10 +1140,7 @@
                     </a:defRPr>
                   </a:pPr>
                   <a:r>
-                    <a:t>Следете актуалните обяви за</a:t>
-                  </a:r>
-                  <a:r>
-                    <a:t> </a:t>
+                    <a:t>Следете актуалните обяви за </a:t>
                   </a:r>
                   <a:r>
                     <a:rPr b="1"/>
@@ -1171,7 +1168,7 @@
               <p:spPr>
                 <a:xfrm>
                   <a:off x="-1" y="18097"/>
-                  <a:ext cx="472595" cy="472594"/>
+                  <a:ext cx="472596" cy="472598"/>
                 </a:xfrm>
                 <a:prstGeom prst="rect">
                   <a:avLst/>
@@ -1202,8 +1199,8 @@
             </p:blipFill>
             <p:spPr>
               <a:xfrm>
-                <a:off x="5235754" y="160478"/>
-                <a:ext cx="730047" cy="167511"/>
+                <a:off x="5235757" y="160478"/>
+                <a:ext cx="730049" cy="167514"/>
               </a:xfrm>
               <a:prstGeom prst="rect">
                 <a:avLst/>
@@ -1234,8 +1231,8 @@
           </p:blipFill>
           <p:spPr>
             <a:xfrm>
-              <a:off x="138068" y="150713"/>
-              <a:ext cx="179714" cy="207361"/>
+              <a:off x="138067" y="150713"/>
+              <a:ext cx="179716" cy="207363"/>
             </a:xfrm>
             <a:prstGeom prst="rect">
               <a:avLst/>
@@ -1267,7 +1264,7 @@
         <p:spPr>
           <a:xfrm>
             <a:off x="601141" y="579944"/>
-            <a:ext cx="381001" cy="419101"/>
+            <a:ext cx="381002" cy="419102"/>
           </a:xfrm>
           <a:prstGeom prst="rect">
             <a:avLst/>
@@ -1350,7 +1347,7 @@
           </a:ln>
         </p:spPr>
         <p:txBody>
-          <a:bodyPr lIns="45719" rIns="45719" anchor="ctr"/>
+          <a:bodyPr lIns="45718" tIns="45718" rIns="45718" bIns="45718" anchor="ctr"/>
           <a:lstStyle/>
           <a:p>
             <a:pPr algn="ctr">
@@ -1371,10 +1368,10 @@
         </p:nvGrpSpPr>
         <p:grpSpPr>
           <a:xfrm>
-            <a:off x="235973" y="216310"/>
-            <a:ext cx="11729886" cy="5801034"/>
+            <a:off x="235973" y="216309"/>
+            <a:ext cx="11729888" cy="5801036"/>
             <a:chOff x="0" y="0"/>
-            <a:chExt cx="11729884" cy="5801033"/>
+            <a:chExt cx="11729887" cy="5801035"/>
           </a:xfrm>
         </p:grpSpPr>
         <p:sp>
@@ -1385,8 +1382,8 @@
           </p:nvSpPr>
           <p:spPr>
             <a:xfrm>
-              <a:off x="0" y="0"/>
-              <a:ext cx="11729885" cy="5801034"/>
+              <a:off x="0" y="-1"/>
+              <a:ext cx="11729888" cy="5801036"/>
             </a:xfrm>
             <a:prstGeom prst="roundRect">
               <a:avLst>
@@ -1403,7 +1400,7 @@
             <a:effectLst/>
           </p:spPr>
           <p:txBody>
-            <a:bodyPr wrap="square" lIns="45719" tIns="45719" rIns="45719" bIns="45719" numCol="1" anchor="ctr">
+            <a:bodyPr wrap="square" lIns="45718" tIns="45718" rIns="45718" bIns="45718" numCol="1" anchor="ctr">
               <a:noAutofit/>
             </a:bodyPr>
             <a:lstStyle/>
@@ -1426,8 +1423,8 @@
           </p:nvSpPr>
           <p:spPr>
             <a:xfrm>
-              <a:off x="94176" y="2733972"/>
-              <a:ext cx="11541532" cy="333089"/>
+              <a:off x="94175" y="2733972"/>
+              <a:ext cx="11541536" cy="333086"/>
             </a:xfrm>
             <a:prstGeom prst="rect">
               <a:avLst/>
@@ -1445,7 +1442,7 @@
             </a:extLst>
           </p:spPr>
           <p:txBody>
-            <a:bodyPr wrap="square" lIns="45719" tIns="45719" rIns="45719" bIns="45719" numCol="1" anchor="ctr">
+            <a:bodyPr wrap="square" lIns="45718" tIns="45718" rIns="45718" bIns="45718" numCol="1" anchor="ctr">
               <a:spAutoFit/>
             </a:bodyPr>
             <a:lstStyle>
@@ -1477,7 +1474,7 @@
         <p:spPr>
           <a:xfrm>
             <a:off x="1360556" y="1459723"/>
-            <a:ext cx="7986644" cy="1200330"/>
+            <a:ext cx="7986645" cy="1200331"/>
           </a:xfrm>
           <a:prstGeom prst="rect">
             <a:avLst/>
@@ -1529,7 +1526,7 @@
         <p:spPr>
           <a:xfrm>
             <a:off x="1354138" y="4042171"/>
-            <a:ext cx="6551815" cy="585247"/>
+            <a:ext cx="6551815" cy="585248"/>
           </a:xfrm>
           <a:prstGeom prst="rect">
             <a:avLst/>
@@ -1569,8 +1566,8 @@
         </p:blipFill>
         <p:spPr>
           <a:xfrm>
-            <a:off x="469638" y="5702144"/>
-            <a:ext cx="4656509" cy="1155856"/>
+            <a:off x="469638" y="5702143"/>
+            <a:ext cx="4656510" cy="1155857"/>
           </a:xfrm>
           <a:prstGeom prst="rect">
             <a:avLst/>
@@ -1588,10 +1585,10 @@
         </p:nvGrpSpPr>
         <p:grpSpPr>
           <a:xfrm>
-            <a:off x="5859703" y="6177667"/>
-            <a:ext cx="6129099" cy="490692"/>
-            <a:chOff x="0" y="0"/>
-            <a:chExt cx="6129097" cy="490690"/>
+            <a:off x="5859699" y="6177667"/>
+            <a:ext cx="6129106" cy="490696"/>
+            <a:chOff x="-3" y="0"/>
+            <a:chExt cx="6129104" cy="490695"/>
           </a:xfrm>
         </p:grpSpPr>
         <p:grpSp>
@@ -1602,10 +1599,10 @@
           </p:nvGrpSpPr>
           <p:grpSpPr>
             <a:xfrm>
-              <a:off x="-1" y="0"/>
-              <a:ext cx="6129099" cy="490691"/>
-              <a:chOff x="0" y="0"/>
-              <a:chExt cx="6129097" cy="490690"/>
+              <a:off x="-4" y="-1"/>
+              <a:ext cx="6129106" cy="490696"/>
+              <a:chOff x="-2" y="0"/>
+              <a:chExt cx="6129104" cy="490695"/>
             </a:xfrm>
           </p:grpSpPr>
           <p:grpSp>
@@ -1616,10 +1613,10 @@
             </p:nvGrpSpPr>
             <p:grpSpPr>
               <a:xfrm>
-                <a:off x="-1" y="0"/>
-                <a:ext cx="6129099" cy="490691"/>
+                <a:off x="-3" y="0"/>
+                <a:ext cx="6129106" cy="490696"/>
                 <a:chOff x="0" y="0"/>
-                <a:chExt cx="6129098" cy="490690"/>
+                <a:chExt cx="6129104" cy="490694"/>
               </a:xfrm>
             </p:grpSpPr>
             <p:sp>
@@ -1630,8 +1627,8 @@
               </p:nvSpPr>
               <p:spPr>
                 <a:xfrm>
-                  <a:off x="236297" y="0"/>
-                  <a:ext cx="5892801" cy="472594"/>
+                  <a:off x="236297" y="-1"/>
+                  <a:ext cx="5892807" cy="472599"/>
                 </a:xfrm>
                 <a:prstGeom prst="roundRect">
                   <a:avLst>
@@ -1648,7 +1645,7 @@
                 <a:effectLst/>
               </p:spPr>
               <p:txBody>
-                <a:bodyPr wrap="square" lIns="45719" tIns="45719" rIns="45719" bIns="45719" numCol="1" anchor="ctr">
+                <a:bodyPr wrap="square" lIns="45718" tIns="45718" rIns="45718" bIns="45718" numCol="1" anchor="ctr">
                   <a:noAutofit/>
                 </a:bodyPr>
                 <a:lstStyle/>
@@ -1672,7 +1669,7 @@
               <p:spPr>
                 <a:xfrm>
                   <a:off x="484857" y="75856"/>
-                  <a:ext cx="4875293" cy="294641"/>
+                  <a:ext cx="4875299" cy="294639"/>
                 </a:xfrm>
                 <a:prstGeom prst="rect">
                   <a:avLst/>
@@ -1690,7 +1687,7 @@
                 </a:extLst>
               </p:spPr>
               <p:txBody>
-                <a:bodyPr wrap="square" lIns="45719" tIns="45719" rIns="45719" bIns="45719" numCol="1" anchor="t">
+                <a:bodyPr wrap="square" lIns="45718" tIns="45718" rIns="45718" bIns="45718" numCol="1" anchor="t">
                   <a:spAutoFit/>
                 </a:bodyPr>
                 <a:lstStyle/>
@@ -1710,10 +1707,7 @@
                     </a:defRPr>
                   </a:pPr>
                   <a:r>
-                    <a:t>Следете актуалните обяви за</a:t>
-                  </a:r>
-                  <a:r>
-                    <a:t> </a:t>
+                    <a:t>Следете актуалните обяви за </a:t>
                   </a:r>
                   <a:r>
                     <a:rPr b="1"/>
@@ -1741,7 +1735,7 @@
               <p:spPr>
                 <a:xfrm>
                   <a:off x="-1" y="18097"/>
-                  <a:ext cx="472595" cy="472594"/>
+                  <a:ext cx="472596" cy="472598"/>
                 </a:xfrm>
                 <a:prstGeom prst="rect">
                   <a:avLst/>
@@ -1772,8 +1766,8 @@
             </p:blipFill>
             <p:spPr>
               <a:xfrm>
-                <a:off x="5235754" y="160478"/>
-                <a:ext cx="730047" cy="167511"/>
+                <a:off x="5235757" y="160478"/>
+                <a:ext cx="730049" cy="167514"/>
               </a:xfrm>
               <a:prstGeom prst="rect">
                 <a:avLst/>
@@ -1804,8 +1798,8 @@
           </p:blipFill>
           <p:spPr>
             <a:xfrm>
-              <a:off x="138068" y="150713"/>
-              <a:ext cx="179714" cy="207361"/>
+              <a:off x="138067" y="150713"/>
+              <a:ext cx="179716" cy="207363"/>
             </a:xfrm>
             <a:prstGeom prst="rect">
               <a:avLst/>
@@ -1837,7 +1831,7 @@
         <p:spPr>
           <a:xfrm>
             <a:off x="601141" y="579944"/>
-            <a:ext cx="381001" cy="419101"/>
+            <a:ext cx="381002" cy="419102"/>
           </a:xfrm>
           <a:prstGeom prst="rect">
             <a:avLst/>
@@ -1920,7 +1914,7 @@
           </a:ln>
         </p:spPr>
         <p:txBody>
-          <a:bodyPr lIns="45719" rIns="45719" anchor="ctr"/>
+          <a:bodyPr lIns="45718" tIns="45718" rIns="45718" bIns="45718" anchor="ctr"/>
           <a:lstStyle/>
           <a:p>
             <a:pPr algn="ctr">
@@ -1942,9 +1936,9 @@
         <p:grpSpPr>
           <a:xfrm>
             <a:off x="235973" y="216310"/>
-            <a:ext cx="11729886" cy="4213451"/>
+            <a:ext cx="11729888" cy="4213452"/>
             <a:chOff x="0" y="0"/>
-            <a:chExt cx="11729884" cy="4213450"/>
+            <a:chExt cx="11729887" cy="4213451"/>
           </a:xfrm>
         </p:grpSpPr>
         <p:sp>
@@ -1956,7 +1950,7 @@
           <p:spPr>
             <a:xfrm>
               <a:off x="0" y="0"/>
-              <a:ext cx="11729885" cy="4213451"/>
+              <a:ext cx="11729888" cy="4213452"/>
             </a:xfrm>
             <a:prstGeom prst="roundRect">
               <a:avLst>
@@ -1973,7 +1967,7 @@
             <a:effectLst/>
           </p:spPr>
           <p:txBody>
-            <a:bodyPr wrap="square" lIns="45719" tIns="45719" rIns="45719" bIns="45719" numCol="1" anchor="ctr">
+            <a:bodyPr wrap="square" lIns="45718" tIns="45718" rIns="45718" bIns="45718" numCol="1" anchor="ctr">
               <a:noAutofit/>
             </a:bodyPr>
             <a:lstStyle/>
@@ -1997,7 +1991,7 @@
           <p:spPr>
             <a:xfrm>
               <a:off x="80915" y="1940181"/>
-              <a:ext cx="11568053" cy="333088"/>
+              <a:ext cx="11568056" cy="333086"/>
             </a:xfrm>
             <a:prstGeom prst="rect">
               <a:avLst/>
@@ -2015,7 +2009,7 @@
             </a:extLst>
           </p:spPr>
           <p:txBody>
-            <a:bodyPr wrap="square" lIns="45719" tIns="45719" rIns="45719" bIns="45719" numCol="1" anchor="ctr">
+            <a:bodyPr wrap="square" lIns="45718" tIns="45718" rIns="45718" bIns="45718" numCol="1" anchor="ctr">
               <a:spAutoFit/>
             </a:bodyPr>
             <a:lstStyle>
@@ -2044,8 +2038,8 @@
         </p:nvSpPr>
         <p:spPr>
           <a:xfrm>
-            <a:off x="1094954" y="819253"/>
-            <a:ext cx="3279030" cy="701041"/>
+            <a:off x="1094953" y="819253"/>
+            <a:ext cx="3279032" cy="701039"/>
           </a:xfrm>
           <a:prstGeom prst="rect">
             <a:avLst/>
@@ -2060,7 +2054,7 @@
           </a:extLst>
         </p:spPr>
         <p:txBody>
-          <a:bodyPr lIns="45719" rIns="45719">
+          <a:bodyPr lIns="45718" tIns="45718" rIns="45718" bIns="45718">
             <a:spAutoFit/>
           </a:bodyPr>
           <a:lstStyle>
@@ -2092,8 +2086,8 @@
         </p:nvSpPr>
         <p:spPr>
           <a:xfrm>
-            <a:off x="1094954" y="2915353"/>
-            <a:ext cx="6604884" cy="332741"/>
+            <a:off x="1094954" y="2915354"/>
+            <a:ext cx="6604883" cy="332739"/>
           </a:xfrm>
           <a:prstGeom prst="rect">
             <a:avLst/>
@@ -2108,7 +2102,7 @@
           </a:extLst>
         </p:spPr>
         <p:txBody>
-          <a:bodyPr lIns="45719" rIns="45719">
+          <a:bodyPr lIns="45718" tIns="45718" rIns="45718" bIns="45718">
             <a:spAutoFit/>
           </a:bodyPr>
           <a:lstStyle>
@@ -2140,8 +2134,8 @@
         </p:nvSpPr>
         <p:spPr>
           <a:xfrm>
-            <a:off x="1028753" y="3566660"/>
-            <a:ext cx="10114013" cy="1948942"/>
+            <a:off x="1028753" y="3566659"/>
+            <a:ext cx="10114013" cy="1948943"/>
           </a:xfrm>
           <a:prstGeom prst="roundRect">
             <a:avLst>
@@ -2164,7 +2158,7 @@
           </a:ln>
         </p:spPr>
         <p:txBody>
-          <a:bodyPr lIns="45719" rIns="45719" anchor="ctr"/>
+          <a:bodyPr lIns="45718" tIns="45718" rIns="45718" bIns="45718" anchor="ctr"/>
           <a:lstStyle/>
           <a:p>
             <a:pPr algn="ctr">
@@ -2186,7 +2180,7 @@
         <p:spPr>
           <a:xfrm>
             <a:off x="2919184" y="3864409"/>
-            <a:ext cx="2110433" cy="303814"/>
+            <a:ext cx="2110434" cy="303815"/>
           </a:xfrm>
           <a:prstGeom prst="roundRect">
             <a:avLst>
@@ -2201,7 +2195,7 @@
           </a:ln>
         </p:spPr>
         <p:txBody>
-          <a:bodyPr lIns="45719" rIns="45719" anchor="ctr"/>
+          <a:bodyPr lIns="45718" tIns="45718" rIns="45718" bIns="45718" anchor="ctr"/>
           <a:lstStyle/>
           <a:p>
             <a:pPr algn="ctr">
@@ -2225,7 +2219,7 @@
         <p:spPr>
           <a:xfrm>
             <a:off x="2866936" y="3907552"/>
-            <a:ext cx="2201945" cy="160339"/>
+            <a:ext cx="2201946" cy="160340"/>
           </a:xfrm>
           <a:prstGeom prst="rect">
             <a:avLst/>
@@ -2311,7 +2305,7 @@
         <p:spPr>
           <a:xfrm>
             <a:off x="1028753" y="3566659"/>
-            <a:ext cx="1321041" cy="1016206"/>
+            <a:ext cx="1321039" cy="1016207"/>
           </a:xfrm>
           <a:custGeom>
             <a:avLst/>
@@ -2365,7 +2359,7 @@
           </a:ln>
         </p:spPr>
         <p:txBody>
-          <a:bodyPr lIns="45719" rIns="45719" anchor="ctr"/>
+          <a:bodyPr lIns="45718" tIns="45718" rIns="45718" bIns="45718" anchor="ctr"/>
           <a:lstStyle/>
           <a:p>
             <a:pPr algn="ctr">
@@ -2389,7 +2383,7 @@
         <p:spPr>
           <a:xfrm>
             <a:off x="2919184" y="4346075"/>
-            <a:ext cx="7834556" cy="341633"/>
+            <a:ext cx="7834556" cy="341634"/>
           </a:xfrm>
           <a:prstGeom prst="rect">
             <a:avLst/>
@@ -2402,7 +2396,7 @@
               <a:spcBef>
                 <a:spcPts val="900"/>
               </a:spcBef>
-              <a:defRPr sz="1656">
+              <a:defRPr sz="1600">
                 <a:solidFill>
                   <a:srgbClr val="FFFFFF"/>
                 </a:solidFill>
@@ -2427,8 +2421,8 @@
         </p:nvSpPr>
         <p:spPr>
           <a:xfrm>
-            <a:off x="2919184" y="5106628"/>
-            <a:ext cx="2201945" cy="138195"/>
+            <a:off x="2919183" y="5106627"/>
+            <a:ext cx="2201947" cy="138196"/>
           </a:xfrm>
           <a:prstGeom prst="rect">
             <a:avLst/>
@@ -2437,11 +2431,11 @@
         <p:txBody>
           <a:bodyPr/>
           <a:lstStyle>
-            <a:lvl1pPr marL="0" indent="0" defTabSz="365760">
+            <a:lvl1pPr marL="0" indent="0" defTabSz="365759">
               <a:spcBef>
                 <a:spcPts val="400"/>
               </a:spcBef>
-              <a:defRPr sz="360">
+              <a:defRPr sz="300">
                 <a:solidFill>
                   <a:srgbClr val="FFFFFF"/>
                 </a:solidFill>
@@ -2464,8 +2458,8 @@
         </p:nvSpPr>
         <p:spPr>
           <a:xfrm>
-            <a:off x="2964904" y="4875798"/>
-            <a:ext cx="569598" cy="231141"/>
+            <a:off x="2964903" y="4875799"/>
+            <a:ext cx="569599" cy="231139"/>
           </a:xfrm>
           <a:prstGeom prst="rect">
             <a:avLst/>
@@ -2480,7 +2474,7 @@
           </a:extLst>
         </p:spPr>
         <p:txBody>
-          <a:bodyPr lIns="45719" rIns="45719">
+          <a:bodyPr lIns="45718" tIns="45718" rIns="45718" bIns="45718">
             <a:spAutoFit/>
           </a:bodyPr>
           <a:lstStyle>
@@ -2514,8 +2508,8 @@
         </p:nvSpPr>
         <p:spPr>
           <a:xfrm>
-            <a:off x="5624676" y="5106628"/>
-            <a:ext cx="1457757" cy="138194"/>
+            <a:off x="5624676" y="5106627"/>
+            <a:ext cx="1457758" cy="138195"/>
           </a:xfrm>
           <a:prstGeom prst="rect">
             <a:avLst/>
@@ -2524,11 +2518,11 @@
         <p:txBody>
           <a:bodyPr/>
           <a:lstStyle>
-            <a:lvl1pPr marL="0" indent="0" defTabSz="365760">
+            <a:lvl1pPr marL="0" indent="0" defTabSz="365759">
               <a:spcBef>
                 <a:spcPts val="400"/>
               </a:spcBef>
-              <a:defRPr sz="360">
+              <a:defRPr sz="300">
                 <a:solidFill>
                   <a:srgbClr val="FFFFFF"/>
                 </a:solidFill>
@@ -2551,8 +2545,8 @@
         </p:nvSpPr>
         <p:spPr>
           <a:xfrm>
-            <a:off x="5670396" y="4875798"/>
-            <a:ext cx="581905" cy="231141"/>
+            <a:off x="5670396" y="4875799"/>
+            <a:ext cx="581906" cy="231139"/>
           </a:xfrm>
           <a:prstGeom prst="rect">
             <a:avLst/>
@@ -2567,7 +2561,7 @@
           </a:extLst>
         </p:spPr>
         <p:txBody>
-          <a:bodyPr lIns="45719" rIns="45719">
+          <a:bodyPr lIns="45718" tIns="45718" rIns="45718" bIns="45718">
             <a:spAutoFit/>
           </a:bodyPr>
           <a:lstStyle>
@@ -2601,8 +2595,8 @@
         </p:nvSpPr>
         <p:spPr>
           <a:xfrm>
-            <a:off x="7500611" y="5106628"/>
-            <a:ext cx="1578963" cy="138195"/>
+            <a:off x="7500611" y="5106627"/>
+            <a:ext cx="1578964" cy="138196"/>
           </a:xfrm>
           <a:prstGeom prst="rect">
             <a:avLst/>
@@ -2611,11 +2605,11 @@
         <p:txBody>
           <a:bodyPr/>
           <a:lstStyle>
-            <a:lvl1pPr marL="0" indent="0" defTabSz="365760">
+            <a:lvl1pPr marL="0" indent="0" defTabSz="365759">
               <a:spcBef>
                 <a:spcPts val="400"/>
               </a:spcBef>
-              <a:defRPr sz="360">
+              <a:defRPr sz="300">
                 <a:solidFill>
                   <a:srgbClr val="FFFFFF"/>
                 </a:solidFill>
@@ -2638,8 +2632,8 @@
         </p:nvSpPr>
         <p:spPr>
           <a:xfrm>
-            <a:off x="7546330" y="4875798"/>
-            <a:ext cx="653304" cy="231141"/>
+            <a:off x="7546330" y="4875799"/>
+            <a:ext cx="653305" cy="231139"/>
           </a:xfrm>
           <a:prstGeom prst="rect">
             <a:avLst/>
@@ -2654,7 +2648,7 @@
           </a:extLst>
         </p:spPr>
         <p:txBody>
-          <a:bodyPr lIns="45719" rIns="45719">
+          <a:bodyPr lIns="45718" tIns="45718" rIns="45718" bIns="45718">
             <a:spAutoFit/>
           </a:bodyPr>
           <a:lstStyle>
@@ -2698,8 +2692,8 @@
         </p:blipFill>
         <p:spPr>
           <a:xfrm rot="10800000">
-            <a:off x="8449739" y="3566658"/>
-            <a:ext cx="2693027" cy="808643"/>
+            <a:off x="8449739" y="3566657"/>
+            <a:ext cx="2693028" cy="808644"/>
           </a:xfrm>
           <a:prstGeom prst="rect">
             <a:avLst/>
@@ -2719,15 +2713,15 @@
         </p:nvSpPr>
         <p:spPr>
           <a:xfrm>
-            <a:off x="1501635" y="3907552"/>
-            <a:ext cx="1139159" cy="1083549"/>
+            <a:off x="1501634" y="3907552"/>
+            <a:ext cx="1139160" cy="1083550"/>
           </a:xfrm>
           <a:prstGeom prst="rect">
             <a:avLst/>
           </a:prstGeom>
         </p:spPr>
         <p:txBody>
-          <a:bodyPr lIns="91439" rIns="91439">
+          <a:bodyPr lIns="91439" tIns="45719" rIns="91439" bIns="45719">
             <a:noAutofit/>
           </a:bodyPr>
           <a:lstStyle/>
@@ -2745,7 +2739,7 @@
           <p:nvPr/>
         </p:nvPicPr>
         <p:blipFill>
-          <a:blip r:embed="rId3">
+          <a:blip r:embed="rId2">
             <a:extLst/>
           </a:blip>
           <a:srcRect l="0" t="0" r="0" b="44967"/>
@@ -2755,8 +2749,8 @@
         </p:blipFill>
         <p:spPr>
           <a:xfrm>
-            <a:off x="469638" y="5702144"/>
-            <a:ext cx="4656509" cy="1155856"/>
+            <a:off x="469638" y="5702143"/>
+            <a:ext cx="4656510" cy="1155857"/>
           </a:xfrm>
           <a:prstGeom prst="rect">
             <a:avLst/>
@@ -2774,10 +2768,10 @@
         </p:nvGrpSpPr>
         <p:grpSpPr>
           <a:xfrm>
-            <a:off x="5859703" y="6177667"/>
-            <a:ext cx="6129099" cy="490692"/>
-            <a:chOff x="0" y="0"/>
-            <a:chExt cx="6129097" cy="490690"/>
+            <a:off x="5859699" y="6177667"/>
+            <a:ext cx="6129106" cy="490696"/>
+            <a:chOff x="-3" y="0"/>
+            <a:chExt cx="6129104" cy="490695"/>
           </a:xfrm>
         </p:grpSpPr>
         <p:grpSp>
@@ -2788,10 +2782,10 @@
           </p:nvGrpSpPr>
           <p:grpSpPr>
             <a:xfrm>
-              <a:off x="-1" y="0"/>
-              <a:ext cx="6129099" cy="490691"/>
-              <a:chOff x="0" y="0"/>
-              <a:chExt cx="6129097" cy="490690"/>
+              <a:off x="-4" y="-1"/>
+              <a:ext cx="6129106" cy="490696"/>
+              <a:chOff x="-2" y="0"/>
+              <a:chExt cx="6129104" cy="490695"/>
             </a:xfrm>
           </p:grpSpPr>
           <p:grpSp>
@@ -2802,10 +2796,10 @@
             </p:nvGrpSpPr>
             <p:grpSpPr>
               <a:xfrm>
-                <a:off x="-1" y="0"/>
-                <a:ext cx="6129099" cy="490691"/>
+                <a:off x="-3" y="0"/>
+                <a:ext cx="6129106" cy="490696"/>
                 <a:chOff x="0" y="0"/>
-                <a:chExt cx="6129098" cy="490690"/>
+                <a:chExt cx="6129104" cy="490694"/>
               </a:xfrm>
             </p:grpSpPr>
             <p:sp>
@@ -2816,8 +2810,8 @@
               </p:nvSpPr>
               <p:spPr>
                 <a:xfrm>
-                  <a:off x="236297" y="0"/>
-                  <a:ext cx="5892801" cy="472594"/>
+                  <a:off x="236297" y="-1"/>
+                  <a:ext cx="5892807" cy="472599"/>
                 </a:xfrm>
                 <a:prstGeom prst="roundRect">
                   <a:avLst>
@@ -2834,7 +2828,7 @@
                 <a:effectLst/>
               </p:spPr>
               <p:txBody>
-                <a:bodyPr wrap="square" lIns="45719" tIns="45719" rIns="45719" bIns="45719" numCol="1" anchor="ctr">
+                <a:bodyPr wrap="square" lIns="45718" tIns="45718" rIns="45718" bIns="45718" numCol="1" anchor="ctr">
                   <a:noAutofit/>
                 </a:bodyPr>
                 <a:lstStyle/>
@@ -2858,7 +2852,7 @@
               <p:spPr>
                 <a:xfrm>
                   <a:off x="484857" y="75856"/>
-                  <a:ext cx="4875293" cy="294641"/>
+                  <a:ext cx="4875299" cy="294639"/>
                 </a:xfrm>
                 <a:prstGeom prst="rect">
                   <a:avLst/>
@@ -2876,7 +2870,7 @@
                 </a:extLst>
               </p:spPr>
               <p:txBody>
-                <a:bodyPr wrap="square" lIns="45719" tIns="45719" rIns="45719" bIns="45719" numCol="1" anchor="t">
+                <a:bodyPr wrap="square" lIns="45718" tIns="45718" rIns="45718" bIns="45718" numCol="1" anchor="t">
                   <a:spAutoFit/>
                 </a:bodyPr>
                 <a:lstStyle/>
@@ -2896,10 +2890,7 @@
                     </a:defRPr>
                   </a:pPr>
                   <a:r>
-                    <a:t>Следете актуалните обяви за</a:t>
-                  </a:r>
-                  <a:r>
-                    <a:t> </a:t>
+                    <a:t>Следете актуалните обяви за </a:t>
                   </a:r>
                   <a:r>
                     <a:rPr b="1"/>
@@ -2917,7 +2908,7 @@
                 <p:nvPr/>
               </p:nvPicPr>
               <p:blipFill>
-                <a:blip r:embed="rId4">
+                <a:blip r:embed="rId3">
                   <a:extLst/>
                 </a:blip>
                 <a:stretch>
@@ -2927,7 +2918,7 @@
               <p:spPr>
                 <a:xfrm>
                   <a:off x="-1" y="18097"/>
-                  <a:ext cx="472595" cy="472594"/>
+                  <a:ext cx="472596" cy="472598"/>
                 </a:xfrm>
                 <a:prstGeom prst="rect">
                   <a:avLst/>
@@ -2949,7 +2940,7 @@
               <p:nvPr/>
             </p:nvPicPr>
             <p:blipFill>
-              <a:blip r:embed="rId5">
+              <a:blip r:embed="rId4">
                 <a:extLst/>
               </a:blip>
               <a:stretch>
@@ -2958,8 +2949,8 @@
             </p:blipFill>
             <p:spPr>
               <a:xfrm>
-                <a:off x="5235754" y="160478"/>
-                <a:ext cx="730047" cy="167511"/>
+                <a:off x="5235757" y="160478"/>
+                <a:ext cx="730049" cy="167514"/>
               </a:xfrm>
               <a:prstGeom prst="rect">
                 <a:avLst/>
@@ -2981,7 +2972,7 @@
             <p:nvPr/>
           </p:nvPicPr>
           <p:blipFill>
-            <a:blip r:embed="rId6">
+            <a:blip r:embed="rId5">
               <a:extLst/>
             </a:blip>
             <a:stretch>
@@ -2990,8 +2981,8 @@
           </p:blipFill>
           <p:spPr>
             <a:xfrm>
-              <a:off x="138068" y="150713"/>
-              <a:ext cx="179714" cy="207361"/>
+              <a:off x="138067" y="150713"/>
+              <a:ext cx="179716" cy="207363"/>
             </a:xfrm>
             <a:prstGeom prst="rect">
               <a:avLst/>
@@ -3013,7 +3004,7 @@
           <p:nvPr/>
         </p:nvPicPr>
         <p:blipFill>
-          <a:blip r:embed="rId7">
+          <a:blip r:embed="rId6">
             <a:extLst/>
           </a:blip>
           <a:stretch>
@@ -3023,7 +3014,7 @@
         <p:spPr>
           <a:xfrm>
             <a:off x="1279855" y="3602437"/>
-            <a:ext cx="286252" cy="314877"/>
+            <a:ext cx="286253" cy="314878"/>
           </a:xfrm>
           <a:prstGeom prst="rect">
             <a:avLst/>
@@ -3113,7 +3104,7 @@
           </a:ln>
         </p:spPr>
         <p:txBody>
-          <a:bodyPr lIns="45719" rIns="45719" anchor="ctr"/>
+          <a:bodyPr lIns="45718" tIns="45718" rIns="45718" bIns="45718" anchor="ctr"/>
           <a:lstStyle/>
           <a:p>
             <a:pPr algn="ctr">
@@ -3134,10 +3125,10 @@
         </p:nvGrpSpPr>
         <p:grpSpPr>
           <a:xfrm>
-            <a:off x="235973" y="216310"/>
-            <a:ext cx="11729886" cy="5801034"/>
+            <a:off x="235973" y="216309"/>
+            <a:ext cx="11729888" cy="5801036"/>
             <a:chOff x="0" y="0"/>
-            <a:chExt cx="11729884" cy="5801033"/>
+            <a:chExt cx="11729887" cy="5801035"/>
           </a:xfrm>
         </p:grpSpPr>
         <p:sp>
@@ -3148,8 +3139,8 @@
           </p:nvSpPr>
           <p:spPr>
             <a:xfrm>
-              <a:off x="0" y="0"/>
-              <a:ext cx="11729885" cy="5801034"/>
+              <a:off x="0" y="-1"/>
+              <a:ext cx="11729888" cy="5801036"/>
             </a:xfrm>
             <a:prstGeom prst="roundRect">
               <a:avLst>
@@ -3166,7 +3157,7 @@
             <a:effectLst/>
           </p:spPr>
           <p:txBody>
-            <a:bodyPr wrap="square" lIns="45719" tIns="45719" rIns="45719" bIns="45719" numCol="1" anchor="ctr">
+            <a:bodyPr wrap="square" lIns="45718" tIns="45718" rIns="45718" bIns="45718" numCol="1" anchor="ctr">
               <a:noAutofit/>
             </a:bodyPr>
             <a:lstStyle/>
@@ -3189,8 +3180,8 @@
           </p:nvSpPr>
           <p:spPr>
             <a:xfrm>
-              <a:off x="94176" y="2733972"/>
-              <a:ext cx="11541532" cy="333089"/>
+              <a:off x="94175" y="2733972"/>
+              <a:ext cx="11541536" cy="333086"/>
             </a:xfrm>
             <a:prstGeom prst="rect">
               <a:avLst/>
@@ -3208,7 +3199,7 @@
             </a:extLst>
           </p:spPr>
           <p:txBody>
-            <a:bodyPr wrap="square" lIns="45719" tIns="45719" rIns="45719" bIns="45719" numCol="1" anchor="ctr">
+            <a:bodyPr wrap="square" lIns="45718" tIns="45718" rIns="45718" bIns="45718" numCol="1" anchor="ctr">
               <a:spAutoFit/>
             </a:bodyPr>
             <a:lstStyle>
@@ -3248,8 +3239,8 @@
         </p:blipFill>
         <p:spPr>
           <a:xfrm>
-            <a:off x="469638" y="5702144"/>
-            <a:ext cx="4656509" cy="1155856"/>
+            <a:off x="469638" y="5702143"/>
+            <a:ext cx="4656510" cy="1155857"/>
           </a:xfrm>
           <a:prstGeom prst="rect">
             <a:avLst/>
@@ -3259,71 +3250,9 @@
           </a:ln>
         </p:spPr>
       </p:pic>
-      <p:sp>
-        <p:nvSpPr>
-          <p:cNvPr id="7" name="Body Level One…"/>
-          <p:cNvSpPr txBox="1"/>
-          <p:nvPr>
-            <p:ph type="body" idx="1" hasCustomPrompt="1"/>
-          </p:nvPr>
-        </p:nvSpPr>
-        <p:spPr>
-          <a:xfrm>
-            <a:off x="1354137" y="3035655"/>
-            <a:ext cx="9483726" cy="1200330"/>
-          </a:xfrm>
-          <a:prstGeom prst="rect">
-            <a:avLst/>
-          </a:prstGeom>
-          <a:ln w="12700">
-            <a:miter lim="400000"/>
-          </a:ln>
-          <a:extLst>
-            <a:ext uri="{C572A759-6A51-4108-AA02-DFA0A04FC94B}">
-              <ma14:wrappingTextBoxFlag xmlns:ma14="http://schemas.microsoft.com/office/mac/drawingml/2011/main" val="1"/>
-            </a:ext>
-          </a:extLst>
-        </p:spPr>
-        <p:txBody>
-          <a:bodyPr lIns="45719" rIns="45719">
-            <a:normAutofit fontScale="100000" lnSpcReduction="0"/>
-          </a:bodyPr>
-          <a:lstStyle/>
-          <a:p>
-            <a:pPr/>
-            <a:r>
-              <a:t>Напиши заглавие на презентацията</a:t>
-            </a:r>
-          </a:p>
-          <a:p>
-            <a:pPr lvl="1"/>
-            <a:r>
-              <a:t/>
-            </a:r>
-          </a:p>
-          <a:p>
-            <a:pPr lvl="2"/>
-            <a:r>
-              <a:t/>
-            </a:r>
-          </a:p>
-          <a:p>
-            <a:pPr lvl="3"/>
-            <a:r>
-              <a:t/>
-            </a:r>
-          </a:p>
-          <a:p>
-            <a:pPr lvl="4"/>
-            <a:r>
-              <a:t/>
-            </a:r>
-          </a:p>
-        </p:txBody>
-      </p:sp>
       <p:pic>
         <p:nvPicPr>
-          <p:cNvPr id="8" name="Graphic 22" descr="Graphic 22"/>
+          <p:cNvPr id="7" name="Graphic 22" descr="Graphic 22"/>
           <p:cNvPicPr>
             <a:picLocks noChangeAspect="1"/>
           </p:cNvPicPr>
@@ -3340,7 +3269,7 @@
         <p:spPr>
           <a:xfrm>
             <a:off x="601141" y="579944"/>
-            <a:ext cx="381001" cy="419101"/>
+            <a:ext cx="381002" cy="419102"/>
           </a:xfrm>
           <a:prstGeom prst="rect">
             <a:avLst/>
@@ -3352,56 +3281,56 @@
       </p:pic>
       <p:grpSp>
         <p:nvGrpSpPr>
-          <p:cNvPr id="16" name="Group 14"/>
+          <p:cNvPr id="15" name="Group 14"/>
           <p:cNvGrpSpPr/>
           <p:nvPr/>
         </p:nvGrpSpPr>
         <p:grpSpPr>
           <a:xfrm>
-            <a:off x="5859703" y="6177667"/>
-            <a:ext cx="6129099" cy="490692"/>
-            <a:chOff x="0" y="0"/>
-            <a:chExt cx="6129097" cy="490690"/>
+            <a:off x="5859699" y="6177667"/>
+            <a:ext cx="6129106" cy="490696"/>
+            <a:chOff x="-3" y="0"/>
+            <a:chExt cx="6129104" cy="490695"/>
           </a:xfrm>
         </p:grpSpPr>
         <p:grpSp>
           <p:nvGrpSpPr>
-            <p:cNvPr id="14" name="Group 11"/>
+            <p:cNvPr id="13" name="Group 11"/>
             <p:cNvGrpSpPr/>
             <p:nvPr/>
           </p:nvGrpSpPr>
           <p:grpSpPr>
             <a:xfrm>
-              <a:off x="-1" y="0"/>
-              <a:ext cx="6129099" cy="490691"/>
-              <a:chOff x="0" y="0"/>
-              <a:chExt cx="6129097" cy="490690"/>
+              <a:off x="-4" y="-1"/>
+              <a:ext cx="6129106" cy="490696"/>
+              <a:chOff x="-2" y="0"/>
+              <a:chExt cx="6129104" cy="490695"/>
             </a:xfrm>
           </p:grpSpPr>
           <p:grpSp>
             <p:nvGrpSpPr>
-              <p:cNvPr id="12" name="Group 3"/>
+              <p:cNvPr id="11" name="Group 3"/>
               <p:cNvGrpSpPr/>
               <p:nvPr/>
             </p:nvGrpSpPr>
             <p:grpSpPr>
               <a:xfrm>
-                <a:off x="-1" y="0"/>
-                <a:ext cx="6129099" cy="490691"/>
+                <a:off x="-3" y="0"/>
+                <a:ext cx="6129106" cy="490696"/>
                 <a:chOff x="0" y="0"/>
-                <a:chExt cx="6129098" cy="490690"/>
+                <a:chExt cx="6129104" cy="490694"/>
               </a:xfrm>
             </p:grpSpPr>
             <p:sp>
               <p:nvSpPr>
-                <p:cNvPr id="9" name="Rounded Rectangle 4"/>
+                <p:cNvPr id="8" name="Rounded Rectangle 4"/>
                 <p:cNvSpPr/>
                 <p:nvPr/>
               </p:nvSpPr>
               <p:spPr>
                 <a:xfrm>
-                  <a:off x="236297" y="0"/>
-                  <a:ext cx="5892801" cy="472594"/>
+                  <a:off x="236297" y="-1"/>
+                  <a:ext cx="5892807" cy="472599"/>
                 </a:xfrm>
                 <a:prstGeom prst="roundRect">
                   <a:avLst>
@@ -3418,7 +3347,7 @@
                 <a:effectLst/>
               </p:spPr>
               <p:txBody>
-                <a:bodyPr wrap="square" lIns="45719" tIns="45719" rIns="45719" bIns="45719" numCol="1" anchor="ctr">
+                <a:bodyPr wrap="square" lIns="45718" tIns="45718" rIns="45718" bIns="45718" numCol="1" anchor="ctr">
                   <a:noAutofit/>
                 </a:bodyPr>
                 <a:lstStyle/>
@@ -3435,14 +3364,14 @@
             </p:sp>
             <p:sp>
               <p:nvSpPr>
-                <p:cNvPr id="10" name="TextBox 5"/>
+                <p:cNvPr id="9" name="TextBox 5"/>
                 <p:cNvSpPr txBox="1"/>
                 <p:nvPr/>
               </p:nvSpPr>
               <p:spPr>
                 <a:xfrm>
                   <a:off x="484857" y="75856"/>
-                  <a:ext cx="4875293" cy="294641"/>
+                  <a:ext cx="4875299" cy="294639"/>
                 </a:xfrm>
                 <a:prstGeom prst="rect">
                   <a:avLst/>
@@ -3460,7 +3389,7 @@
                 </a:extLst>
               </p:spPr>
               <p:txBody>
-                <a:bodyPr wrap="square" lIns="45719" tIns="45719" rIns="45719" bIns="45719" numCol="1" anchor="t">
+                <a:bodyPr wrap="square" lIns="45718" tIns="45718" rIns="45718" bIns="45718" numCol="1" anchor="t">
                   <a:spAutoFit/>
                 </a:bodyPr>
                 <a:lstStyle/>
@@ -3480,10 +3409,7 @@
                     </a:defRPr>
                   </a:pPr>
                   <a:r>
-                    <a:t>Следете актуалните обяви за</a:t>
-                  </a:r>
-                  <a:r>
-                    <a:t> </a:t>
+                    <a:t>Следете актуалните обяви за </a:t>
                   </a:r>
                   <a:r>
                     <a:rPr b="1"/>
@@ -3494,7 +3420,7 @@
             </p:sp>
             <p:pic>
               <p:nvPicPr>
-                <p:cNvPr id="11" name="Picture 7" descr="Picture 7"/>
+                <p:cNvPr id="10" name="Picture 7" descr="Picture 7"/>
                 <p:cNvPicPr>
                   <a:picLocks noChangeAspect="1"/>
                 </p:cNvPicPr>
@@ -3511,7 +3437,7 @@
               <p:spPr>
                 <a:xfrm>
                   <a:off x="-1" y="18097"/>
-                  <a:ext cx="472595" cy="472594"/>
+                  <a:ext cx="472596" cy="472598"/>
                 </a:xfrm>
                 <a:prstGeom prst="rect">
                   <a:avLst/>
@@ -3526,7 +3452,7 @@
           </p:grpSp>
           <p:pic>
             <p:nvPicPr>
-              <p:cNvPr id="13" name="Graphic 10" descr="Graphic 10"/>
+              <p:cNvPr id="12" name="Graphic 10" descr="Graphic 10"/>
               <p:cNvPicPr>
                 <a:picLocks noChangeAspect="1"/>
               </p:cNvPicPr>
@@ -3542,8 +3468,8 @@
             </p:blipFill>
             <p:spPr>
               <a:xfrm>
-                <a:off x="5235754" y="160478"/>
-                <a:ext cx="730047" cy="167511"/>
+                <a:off x="5235757" y="160478"/>
+                <a:ext cx="730049" cy="167514"/>
               </a:xfrm>
               <a:prstGeom prst="rect">
                 <a:avLst/>
@@ -3558,7 +3484,7 @@
         </p:grpSp>
         <p:pic>
           <p:nvPicPr>
-            <p:cNvPr id="15" name="Picture 24" descr="Picture 24"/>
+            <p:cNvPr id="14" name="Picture 24" descr="Picture 24"/>
             <p:cNvPicPr>
               <a:picLocks noChangeAspect="1"/>
             </p:cNvPicPr>
@@ -3574,8 +3500,8 @@
           </p:blipFill>
           <p:spPr>
             <a:xfrm>
-              <a:off x="138068" y="150713"/>
-              <a:ext cx="179714" cy="207361"/>
+              <a:off x="138067" y="150713"/>
+              <a:ext cx="179716" cy="207363"/>
             </a:xfrm>
             <a:prstGeom prst="rect">
               <a:avLst/>
@@ -3590,16 +3516,16 @@
       </p:grpSp>
       <p:sp>
         <p:nvSpPr>
-          <p:cNvPr id="17" name="Title Text"/>
+          <p:cNvPr id="16" name="Body Level One…"/>
           <p:cNvSpPr txBox="1"/>
           <p:nvPr>
-            <p:ph type="title"/>
+            <p:ph type="body" idx="1" hasCustomPrompt="1"/>
           </p:nvPr>
         </p:nvSpPr>
         <p:spPr>
           <a:xfrm>
-            <a:off x="609600" y="0"/>
-            <a:ext cx="10972800" cy="1692275"/>
+            <a:off x="1354137" y="3035655"/>
+            <a:ext cx="9483726" cy="1200331"/>
           </a:xfrm>
           <a:prstGeom prst="rect">
             <a:avLst/>
@@ -3614,7 +3540,69 @@
           </a:extLst>
         </p:spPr>
         <p:txBody>
-          <a:bodyPr lIns="45719" rIns="45719" anchor="ctr"/>
+          <a:bodyPr lIns="45718" tIns="45718" rIns="45718" bIns="45718">
+            <a:normAutofit fontScale="100000" lnSpcReduction="0"/>
+          </a:bodyPr>
+          <a:lstStyle/>
+          <a:p>
+            <a:pPr/>
+            <a:r>
+              <a:t>Напиши заглавие на презентацията</a:t>
+            </a:r>
+          </a:p>
+          <a:p>
+            <a:pPr lvl="1"/>
+            <a:r>
+              <a:t/>
+            </a:r>
+          </a:p>
+          <a:p>
+            <a:pPr lvl="2"/>
+            <a:r>
+              <a:t/>
+            </a:r>
+          </a:p>
+          <a:p>
+            <a:pPr lvl="3"/>
+            <a:r>
+              <a:t/>
+            </a:r>
+          </a:p>
+          <a:p>
+            <a:pPr lvl="4"/>
+            <a:r>
+              <a:t/>
+            </a:r>
+          </a:p>
+        </p:txBody>
+      </p:sp>
+      <p:sp>
+        <p:nvSpPr>
+          <p:cNvPr id="17" name="Title Text"/>
+          <p:cNvSpPr txBox="1"/>
+          <p:nvPr>
+            <p:ph type="title"/>
+          </p:nvPr>
+        </p:nvSpPr>
+        <p:spPr>
+          <a:xfrm>
+            <a:off x="1826683" y="514350"/>
+            <a:ext cx="9753601" cy="2179638"/>
+          </a:xfrm>
+          <a:prstGeom prst="rect">
+            <a:avLst/>
+          </a:prstGeom>
+          <a:ln w="12700">
+            <a:miter lim="400000"/>
+          </a:ln>
+          <a:extLst>
+            <a:ext uri="{C572A759-6A51-4108-AA02-DFA0A04FC94B}">
+              <ma14:wrappingTextBoxFlag xmlns:ma14="http://schemas.microsoft.com/office/mac/drawingml/2011/main" val="1"/>
+            </a:ext>
+          </a:extLst>
+        </p:spPr>
+        <p:txBody>
+          <a:bodyPr lIns="45718" tIns="45718" rIns="45718" bIns="45718" anchor="ctr"/>
           <a:lstStyle/>
           <a:p>
             <a:pPr/>
@@ -3634,8 +3622,8 @@
         </p:nvSpPr>
         <p:spPr>
           <a:xfrm>
-            <a:off x="5892800" y="6172200"/>
-            <a:ext cx="2844800" cy="368301"/>
+            <a:off x="8478978" y="6232199"/>
+            <a:ext cx="258623" cy="248303"/>
           </a:xfrm>
           <a:prstGeom prst="rect">
             <a:avLst/>
@@ -3645,7 +3633,7 @@
           </a:ln>
         </p:spPr>
         <p:txBody>
-          <a:bodyPr wrap="none" lIns="45719" rIns="45719" anchor="ctr">
+          <a:bodyPr wrap="none" lIns="45718" tIns="45718" rIns="45718" bIns="45718" anchor="ctr">
             <a:spAutoFit/>
           </a:bodyPr>
           <a:lstStyle>
@@ -4169,7 +4157,7 @@
           <a:sym typeface="Calibri"/>
         </a:defRPr>
       </a:lvl1pPr>
-      <a:lvl2pPr marL="0" marR="0" indent="457200" algn="r" defTabSz="457200" rtl="0" latinLnBrk="0">
+      <a:lvl2pPr marL="0" marR="0" indent="0" algn="r" defTabSz="457200" rtl="0" latinLnBrk="0">
         <a:lnSpc>
           <a:spcPct val="100000"/>
         </a:lnSpc>
@@ -4195,7 +4183,7 @@
           <a:sym typeface="Calibri"/>
         </a:defRPr>
       </a:lvl2pPr>
-      <a:lvl3pPr marL="0" marR="0" indent="914400" algn="r" defTabSz="457200" rtl="0" latinLnBrk="0">
+      <a:lvl3pPr marL="0" marR="0" indent="0" algn="r" defTabSz="457200" rtl="0" latinLnBrk="0">
         <a:lnSpc>
           <a:spcPct val="100000"/>
         </a:lnSpc>
@@ -4221,7 +4209,7 @@
           <a:sym typeface="Calibri"/>
         </a:defRPr>
       </a:lvl3pPr>
-      <a:lvl4pPr marL="0" marR="0" indent="1371600" algn="r" defTabSz="457200" rtl="0" latinLnBrk="0">
+      <a:lvl4pPr marL="0" marR="0" indent="0" algn="r" defTabSz="457200" rtl="0" latinLnBrk="0">
         <a:lnSpc>
           <a:spcPct val="100000"/>
         </a:lnSpc>
@@ -4247,7 +4235,7 @@
           <a:sym typeface="Calibri"/>
         </a:defRPr>
       </a:lvl4pPr>
-      <a:lvl5pPr marL="0" marR="0" indent="1828800" algn="r" defTabSz="457200" rtl="0" latinLnBrk="0">
+      <a:lvl5pPr marL="0" marR="0" indent="0" algn="r" defTabSz="457200" rtl="0" latinLnBrk="0">
         <a:lnSpc>
           <a:spcPct val="100000"/>
         </a:lnSpc>
@@ -4273,7 +4261,7 @@
           <a:sym typeface="Calibri"/>
         </a:defRPr>
       </a:lvl5pPr>
-      <a:lvl6pPr marL="0" marR="0" indent="2286000" algn="r" defTabSz="457200" rtl="0" latinLnBrk="0">
+      <a:lvl6pPr marL="0" marR="0" indent="0" algn="r" defTabSz="457200" rtl="0" latinLnBrk="0">
         <a:lnSpc>
           <a:spcPct val="100000"/>
         </a:lnSpc>
@@ -4299,7 +4287,7 @@
           <a:sym typeface="Calibri"/>
         </a:defRPr>
       </a:lvl6pPr>
-      <a:lvl7pPr marL="0" marR="0" indent="2743200" algn="r" defTabSz="457200" rtl="0" latinLnBrk="0">
+      <a:lvl7pPr marL="0" marR="0" indent="0" algn="r" defTabSz="457200" rtl="0" latinLnBrk="0">
         <a:lnSpc>
           <a:spcPct val="100000"/>
         </a:lnSpc>
@@ -4325,7 +4313,7 @@
           <a:sym typeface="Calibri"/>
         </a:defRPr>
       </a:lvl7pPr>
-      <a:lvl8pPr marL="0" marR="0" indent="3200400" algn="r" defTabSz="457200" rtl="0" latinLnBrk="0">
+      <a:lvl8pPr marL="0" marR="0" indent="0" algn="r" defTabSz="457200" rtl="0" latinLnBrk="0">
         <a:lnSpc>
           <a:spcPct val="100000"/>
         </a:lnSpc>
@@ -4351,7 +4339,7 @@
           <a:sym typeface="Calibri"/>
         </a:defRPr>
       </a:lvl8pPr>
-      <a:lvl9pPr marL="0" marR="0" indent="3657600" algn="r" defTabSz="457200" rtl="0" latinLnBrk="0">
+      <a:lvl9pPr marL="0" marR="0" indent="0" algn="r" defTabSz="457200" rtl="0" latinLnBrk="0">
         <a:lnSpc>
           <a:spcPct val="100000"/>
         </a:lnSpc>
@@ -4410,7 +4398,7 @@
         <p:spPr>
           <a:xfrm>
             <a:off x="1354137" y="3035655"/>
-            <a:ext cx="9483726" cy="1200330"/>
+            <a:ext cx="9483726" cy="1200331"/>
           </a:xfrm>
           <a:prstGeom prst="rect">
             <a:avLst/>
@@ -4444,8 +4432,8 @@
         </p:nvSpPr>
         <p:spPr>
           <a:xfrm>
-            <a:off x="3189396" y="2145048"/>
-            <a:ext cx="3451220" cy="284488"/>
+            <a:off x="3189396" y="2145047"/>
+            <a:ext cx="3451221" cy="284489"/>
           </a:xfrm>
           <a:prstGeom prst="rect">
             <a:avLst/>
@@ -4463,7 +4451,7 @@
               <a:spcBef>
                 <a:spcPts val="700"/>
               </a:spcBef>
-              <a:defRPr sz="1078"/>
+              <a:defRPr sz="1000"/>
             </a:lvl1pPr>
           </a:lstStyle>
           <a:p>
@@ -4496,7 +4484,7 @@
         <p:spPr>
           <a:xfrm>
             <a:off x="1382703" y="1344842"/>
-            <a:ext cx="1488089" cy="1415257"/>
+            <a:ext cx="1488090" cy="1415257"/>
           </a:xfrm>
           <a:custGeom>
             <a:avLst/>
@@ -4523,23 +4511,23 @@
                   <a:pt x="10800" y="0"/>
                 </a:moveTo>
                 <a:cubicBezTo>
-                  <a:pt x="4836" y="0"/>
+                  <a:pt x="4837" y="0"/>
                   <a:pt x="0" y="4835"/>
                   <a:pt x="0" y="10800"/>
                 </a:cubicBezTo>
                 <a:cubicBezTo>
                   <a:pt x="0" y="16765"/>
-                  <a:pt x="4836" y="21600"/>
+                  <a:pt x="4837" y="21600"/>
                   <a:pt x="10800" y="21600"/>
                 </a:cubicBezTo>
                 <a:cubicBezTo>
-                  <a:pt x="16764" y="21600"/>
+                  <a:pt x="16763" y="21600"/>
                   <a:pt x="21600" y="16765"/>
                   <a:pt x="21600" y="10800"/>
                 </a:cubicBezTo>
                 <a:cubicBezTo>
                   <a:pt x="21600" y="4835"/>
-                  <a:pt x="16764" y="0"/>
+                  <a:pt x="16763" y="0"/>
                   <a:pt x="10800" y="0"/>
                 </a:cubicBezTo>
                 <a:close/>
@@ -4585,7 +4573,7 @@
         <p:spPr>
           <a:xfrm>
             <a:off x="1360556" y="1459724"/>
-            <a:ext cx="7986643" cy="1200329"/>
+            <a:ext cx="7986642" cy="1200329"/>
           </a:xfrm>
           <a:prstGeom prst="rect">
             <a:avLst/>
@@ -4612,8 +4600,8 @@
         </p:nvSpPr>
         <p:spPr>
           <a:xfrm>
-            <a:off x="1354138" y="2851630"/>
-            <a:ext cx="8263497" cy="2658938"/>
+            <a:off x="1354137" y="2851629"/>
+            <a:ext cx="8263499" cy="2658940"/>
           </a:xfrm>
           <a:prstGeom prst="rect">
             <a:avLst/>
@@ -4728,8 +4716,8 @@
         </p:blipFill>
         <p:spPr>
           <a:xfrm>
-            <a:off x="7556976" y="2657099"/>
-            <a:ext cx="4064001" cy="3048001"/>
+            <a:off x="7556975" y="2657099"/>
+            <a:ext cx="4064003" cy="3048002"/>
           </a:xfrm>
           <a:prstGeom prst="rect">
             <a:avLst/>
@@ -4774,6 +4762,10 @@
           </p:nvPr>
         </p:nvSpPr>
         <p:spPr>
+          <a:xfrm>
+            <a:off x="2866936" y="3907552"/>
+            <a:ext cx="2201946" cy="160340"/>
+          </a:xfrm>
           <a:prstGeom prst="rect">
             <a:avLst/>
           </a:prstGeom>
@@ -4786,7 +4778,7 @@
               <a:spcBef>
                 <a:spcPts val="600"/>
               </a:spcBef>
-              <a:defRPr sz="540"/>
+              <a:defRPr sz="500"/>
             </a:pPr>
           </a:p>
         </p:txBody>
@@ -4897,7 +4889,7 @@
         <p:spPr>
           <a:xfrm>
             <a:off x="1501635" y="3907552"/>
-            <a:ext cx="1139033" cy="1083470"/>
+            <a:ext cx="1139032" cy="1083469"/>
           </a:xfrm>
           <a:custGeom>
             <a:avLst/>
@@ -4957,8 +4949,8 @@
         </p:nvSpPr>
         <p:spPr>
           <a:xfrm>
-            <a:off x="6397166" y="896366"/>
-            <a:ext cx="1426376" cy="370841"/>
+            <a:off x="6397166" y="896367"/>
+            <a:ext cx="1426377" cy="370839"/>
           </a:xfrm>
           <a:prstGeom prst="rect">
             <a:avLst/>
@@ -4973,12 +4965,11 @@
           </a:extLst>
         </p:spPr>
         <p:txBody>
-          <a:bodyPr lIns="45719" rIns="45719">
+          <a:bodyPr lIns="45718" tIns="45718" rIns="45718" bIns="45718">
             <a:spAutoFit/>
           </a:bodyPr>
-          <a:lstStyle/>
-          <a:p>
-            <a:pPr>
+          <a:lstStyle>
+            <a:lvl1pPr>
               <a:lnSpc>
                 <a:spcPct val="120000"/>
               </a:lnSpc>
@@ -4991,12 +4982,12 @@
                 <a:cs typeface="Verdana"/>
                 <a:sym typeface="Verdana"/>
               </a:defRPr>
-            </a:pPr>
-            <a:r>
-              <a:t>Contacts</a:t>
-            </a:r>
-            <a:r>
-              <a:t>:</a:t>
+            </a:lvl1pPr>
+          </a:lstStyle>
+          <a:p>
+            <a:pPr/>
+            <a:r>
+              <a:t>Contacts:</a:t>
             </a:r>
           </a:p>
         </p:txBody>
@@ -5020,7 +5011,7 @@
         <p:spPr>
           <a:xfrm>
             <a:off x="6456681" y="2005770"/>
-            <a:ext cx="266701" cy="279401"/>
+            <a:ext cx="266702" cy="279402"/>
           </a:xfrm>
           <a:prstGeom prst="rect">
             <a:avLst/>
@@ -5049,7 +5040,7 @@
         <p:spPr>
           <a:xfrm>
             <a:off x="6475731" y="1532011"/>
-            <a:ext cx="228601" cy="228601"/>
+            <a:ext cx="228602" cy="228602"/>
           </a:xfrm>
           <a:prstGeom prst="rect">
             <a:avLst/>
@@ -5067,8 +5058,8 @@
         </p:nvSpPr>
         <p:spPr>
           <a:xfrm>
-            <a:off x="6836552" y="1527140"/>
-            <a:ext cx="1588087" cy="281941"/>
+            <a:off x="6836551" y="1527141"/>
+            <a:ext cx="1588088" cy="281939"/>
           </a:xfrm>
           <a:prstGeom prst="rect">
             <a:avLst/>
@@ -5083,7 +5074,7 @@
           </a:extLst>
         </p:spPr>
         <p:txBody>
-          <a:bodyPr lIns="45719" rIns="45719">
+          <a:bodyPr lIns="45718" tIns="45718" rIns="45718" bIns="45718">
             <a:spAutoFit/>
           </a:bodyPr>
           <a:lstStyle>
@@ -5118,8 +5109,8 @@
         </p:nvSpPr>
         <p:spPr>
           <a:xfrm>
-            <a:off x="6836552" y="1996214"/>
-            <a:ext cx="1588087" cy="281941"/>
+            <a:off x="6836551" y="1996215"/>
+            <a:ext cx="1588088" cy="281939"/>
           </a:xfrm>
           <a:prstGeom prst="rect">
             <a:avLst/>
@@ -5134,7 +5125,7 @@
           </a:extLst>
         </p:spPr>
         <p:txBody>
-          <a:bodyPr lIns="45719" rIns="45719">
+          <a:bodyPr lIns="45718" tIns="45718" rIns="45718" bIns="45718">
             <a:spAutoFit/>
           </a:bodyPr>
           <a:lstStyle>
@@ -5169,8 +5160,8 @@
         </p:nvSpPr>
         <p:spPr>
           <a:xfrm>
-            <a:off x="9388321" y="1538349"/>
-            <a:ext cx="1588087" cy="281941"/>
+            <a:off x="9388320" y="1538350"/>
+            <a:ext cx="1588088" cy="281939"/>
           </a:xfrm>
           <a:prstGeom prst="rect">
             <a:avLst/>
@@ -5185,7 +5176,7 @@
           </a:extLst>
         </p:spPr>
         <p:txBody>
-          <a:bodyPr lIns="45719" rIns="45719">
+          <a:bodyPr lIns="45718" tIns="45718" rIns="45718" bIns="45718">
             <a:spAutoFit/>
           </a:bodyPr>
           <a:lstStyle>
@@ -5230,8 +5221,8 @@
         </p:blipFill>
         <p:spPr>
           <a:xfrm>
-            <a:off x="9078935" y="1573324"/>
-            <a:ext cx="125731" cy="223521"/>
+            <a:off x="9078934" y="1573324"/>
+            <a:ext cx="125732" cy="223522"/>
           </a:xfrm>
           <a:prstGeom prst="rect">
             <a:avLst/>
@@ -5259,8 +5250,8 @@
         </p:blipFill>
         <p:spPr>
           <a:xfrm>
-            <a:off x="9027500" y="2020137"/>
-            <a:ext cx="228601" cy="228601"/>
+            <a:off x="9027500" y="2020136"/>
+            <a:ext cx="228602" cy="228602"/>
           </a:xfrm>
           <a:prstGeom prst="rect">
             <a:avLst/>
@@ -5278,8 +5269,8 @@
         </p:nvSpPr>
         <p:spPr>
           <a:xfrm>
-            <a:off x="9388320" y="1985389"/>
-            <a:ext cx="1919564" cy="281941"/>
+            <a:off x="9388319" y="1985390"/>
+            <a:ext cx="1919565" cy="281939"/>
           </a:xfrm>
           <a:prstGeom prst="rect">
             <a:avLst/>
@@ -5294,7 +5285,7 @@
           </a:extLst>
         </p:spPr>
         <p:txBody>
-          <a:bodyPr lIns="45719" rIns="45719">
+          <a:bodyPr lIns="45718" tIns="45718" rIns="45718" bIns="45718">
             <a:spAutoFit/>
           </a:bodyPr>
           <a:lstStyle>
@@ -5357,8 +5348,8 @@
         </p:nvSpPr>
         <p:spPr>
           <a:xfrm>
-            <a:off x="1360556" y="1459724"/>
-            <a:ext cx="10037376" cy="1200329"/>
+            <a:off x="1360555" y="1459724"/>
+            <a:ext cx="10037378" cy="1200329"/>
           </a:xfrm>
           <a:prstGeom prst="rect">
             <a:avLst/>
@@ -5367,11 +5358,11 @@
         <p:txBody>
           <a:bodyPr/>
           <a:lstStyle>
-            <a:lvl1pPr marL="219455" indent="-219455" defTabSz="438911">
+            <a:lvl1pPr marL="219454" indent="-219454" defTabSz="438911">
               <a:spcBef>
                 <a:spcPts val="900"/>
               </a:spcBef>
-              <a:defRPr sz="3839"/>
+              <a:defRPr sz="3800"/>
             </a:lvl1pPr>
           </a:lstStyle>
           <a:p>
@@ -5392,8 +5383,8 @@
         </p:nvSpPr>
         <p:spPr>
           <a:xfrm>
-            <a:off x="1354138" y="2851630"/>
-            <a:ext cx="8263497" cy="2658938"/>
+            <a:off x="1354137" y="2851629"/>
+            <a:ext cx="8263499" cy="2658940"/>
           </a:xfrm>
           <a:prstGeom prst="rect">
             <a:avLst/>
@@ -5412,7 +5403,7 @@
               <a:lnSpc>
                 <a:spcPct val="200000"/>
               </a:lnSpc>
-              <a:defRPr spc="126" sz="1900"/>
+              <a:defRPr sz="1900"/>
             </a:pPr>
             <a:r>
               <a:t>- 2 steps </a:t>
@@ -5428,24 +5419,26 @@
               <a:rPr b="1"/>
               <a:t>back</a:t>
             </a:r>
+            <a:endParaRPr spc="126"/>
           </a:p>
           <a:p>
             <a:pPr>
               <a:lnSpc>
                 <a:spcPct val="200000"/>
               </a:lnSpc>
-              <a:defRPr spc="126" sz="1900"/>
+              <a:defRPr sz="1900"/>
             </a:pPr>
             <a:r>
               <a:t>    - Don’t forget back transition</a:t>
             </a:r>
+            <a:endParaRPr spc="126"/>
           </a:p>
           <a:p>
             <a:pPr>
               <a:lnSpc>
                 <a:spcPct val="200000"/>
               </a:lnSpc>
-              <a:defRPr spc="126" sz="1900"/>
+              <a:defRPr sz="1900"/>
             </a:pPr>
             <a:r>
               <a:t>- </a:t>
@@ -5457,13 +5450,14 @@
             <a:r>
               <a:t>, without delay</a:t>
             </a:r>
+            <a:endParaRPr spc="126"/>
           </a:p>
           <a:p>
             <a:pPr>
               <a:lnSpc>
                 <a:spcPct val="200000"/>
               </a:lnSpc>
-              <a:defRPr spc="126" sz="1900"/>
+              <a:defRPr sz="1900"/>
             </a:pPr>
             <a:r>
               <a:t>- </a:t>
@@ -5494,7 +5488,7 @@
         <p:spPr>
           <a:xfrm>
             <a:off x="6901597" y="3318912"/>
-            <a:ext cx="4656535" cy="1724374"/>
+            <a:ext cx="4656536" cy="1724375"/>
           </a:xfrm>
           <a:prstGeom prst="rect">
             <a:avLst/>
@@ -5539,6 +5533,10 @@
           </p:nvPr>
         </p:nvSpPr>
         <p:spPr>
+          <a:xfrm>
+            <a:off x="1360555" y="1459723"/>
+            <a:ext cx="4598070" cy="1754329"/>
+          </a:xfrm>
           <a:prstGeom prst="rect">
             <a:avLst/>
           </a:prstGeom>
@@ -5565,7 +5563,7 @@
         <p:spPr>
           <a:xfrm>
             <a:off x="1179001" y="3863954"/>
-            <a:ext cx="4961179" cy="1663810"/>
+            <a:ext cx="4961179" cy="1663811"/>
           </a:xfrm>
           <a:prstGeom prst="rect">
             <a:avLst/>
@@ -5586,7 +5584,7 @@
               </a:spcBef>
               <a:buSzPct val="100000"/>
               <a:buChar char="-"/>
-              <a:defRPr spc="126" sz="1900"/>
+              <a:defRPr spc="100" sz="1900"/>
             </a:pPr>
             <a:r>
               <a:t>Get a </a:t>
@@ -5595,6 +5593,7 @@
               <a:rPr b="1"/>
               <a:t>Navigator</a:t>
             </a:r>
+            <a:endParaRPr spc="126"/>
           </a:p>
           <a:p>
             <a:pPr defTabSz="914400">
@@ -5609,7 +5608,7 @@
               <a:spcBef>
                 <a:spcPts val="1000"/>
               </a:spcBef>
-              <a:defRPr spc="126" sz="1900"/>
+              <a:defRPr spc="100" sz="1900"/>
             </a:pPr>
             <a:r>
               <a:t>- Use a </a:t>
@@ -5668,8 +5667,8 @@
         </p:blipFill>
         <p:spPr>
           <a:xfrm>
-            <a:off x="9549582" y="2749284"/>
-            <a:ext cx="915462" cy="915462"/>
+            <a:off x="9549582" y="2749283"/>
+            <a:ext cx="915463" cy="915463"/>
           </a:xfrm>
           <a:prstGeom prst="rect">
             <a:avLst/>
@@ -5716,7 +5715,7 @@
         <p:spPr>
           <a:xfrm>
             <a:off x="1360556" y="1459724"/>
-            <a:ext cx="7986643" cy="1200329"/>
+            <a:ext cx="7986642" cy="1200329"/>
           </a:xfrm>
           <a:prstGeom prst="rect">
             <a:avLst/>
@@ -5743,8 +5742,8 @@
         </p:nvSpPr>
         <p:spPr>
           <a:xfrm>
-            <a:off x="1343481" y="2851630"/>
-            <a:ext cx="8263497" cy="2658938"/>
+            <a:off x="1343480" y="2851629"/>
+            <a:ext cx="8263499" cy="2658940"/>
           </a:xfrm>
           <a:prstGeom prst="rect">
             <a:avLst/>
@@ -5759,7 +5758,7 @@
           <a:bodyPr/>
           <a:lstStyle/>
           <a:p>
-            <a:pPr marL="210552" indent="-210552" defTabSz="457200">
+            <a:pPr marL="210551" indent="-210551" defTabSz="457200">
               <a:lnSpc>
                 <a:spcPct val="400000"/>
               </a:lnSpc>
@@ -5783,7 +5782,7 @@
             </a:r>
           </a:p>
           <a:p>
-            <a:pPr marL="210552" indent="-210552" defTabSz="457200">
+            <a:pPr marL="210551" indent="-210551" defTabSz="457200">
               <a:lnSpc>
                 <a:spcPct val="400000"/>
               </a:lnSpc>
@@ -5792,24 +5791,24 @@
               </a:spcBef>
               <a:buSzPct val="100000"/>
               <a:buChar char="-"/>
-              <a:defRPr spc="0" sz="1900">
+              <a:defRPr b="1" spc="0" sz="1900">
                 <a:solidFill>
                   <a:srgbClr val="535353"/>
                 </a:solidFill>
               </a:defRPr>
             </a:pPr>
             <a:r>
-              <a:rPr b="1"/>
               <a:t>Android</a:t>
             </a:r>
             <a:r>
+              <a:rPr b="0"/>
               <a:t> vs </a:t>
             </a:r>
             <a:r>
-              <a:rPr b="1"/>
               <a:t>iOS</a:t>
             </a:r>
             <a:r>
+              <a:rPr b="0"/>
               <a:t> </a:t>
             </a:r>
           </a:p>
@@ -5833,8 +5832,8 @@
         </p:blipFill>
         <p:spPr>
           <a:xfrm>
-            <a:off x="6734670" y="2831927"/>
-            <a:ext cx="4797056" cy="2698344"/>
+            <a:off x="6734670" y="2831926"/>
+            <a:ext cx="4797057" cy="2698345"/>
           </a:xfrm>
           <a:prstGeom prst="rect">
             <a:avLst/>
@@ -5880,8 +5879,8 @@
         </p:nvSpPr>
         <p:spPr>
           <a:xfrm>
-            <a:off x="1360556" y="1459723"/>
-            <a:ext cx="6129099" cy="1032199"/>
+            <a:off x="1360555" y="1459723"/>
+            <a:ext cx="6129101" cy="1032200"/>
           </a:xfrm>
           <a:prstGeom prst="rect">
             <a:avLst/>
@@ -5908,8 +5907,8 @@
         </p:nvSpPr>
         <p:spPr>
           <a:xfrm>
-            <a:off x="1249665" y="2824203"/>
-            <a:ext cx="6551816" cy="2545661"/>
+            <a:off x="1249664" y="2824202"/>
+            <a:ext cx="6551818" cy="2545663"/>
           </a:xfrm>
           <a:prstGeom prst="rect">
             <a:avLst/>
@@ -5930,19 +5929,19 @@
               </a:lnSpc>
               <a:buSzPct val="100000"/>
               <a:buChar char="-"/>
-              <a:defRPr spc="105" sz="1900"/>
+              <a:defRPr b="1" sz="1900"/>
             </a:pPr>
             <a:r>
-              <a:rPr b="1"/>
               <a:t>PageRouteBuilder</a:t>
             </a:r>
             <a:r>
+              <a:rPr b="0"/>
               <a:t> vs expand </a:t>
             </a:r>
             <a:r>
-              <a:rPr b="1"/>
               <a:t>PageRoute</a:t>
             </a:r>
+            <a:endParaRPr spc="104"/>
           </a:p>
           <a:p>
             <a:pPr marL="172270" indent="-172270">
@@ -5951,7 +5950,7 @@
               </a:lnSpc>
               <a:buSzPct val="100000"/>
               <a:buChar char="-"/>
-              <a:defRPr spc="105" sz="1900"/>
+              <a:defRPr sz="1900"/>
             </a:pPr>
             <a:r>
               <a:t>Change </a:t>
@@ -5963,6 +5962,7 @@
             <a:r>
               <a:t> </a:t>
             </a:r>
+            <a:endParaRPr spc="104"/>
           </a:p>
           <a:p>
             <a:pPr lvl="1" marL="553270" indent="-172270" defTabSz="914400">
@@ -5970,18 +5970,19 @@
                 <a:spcPct val="100000"/>
               </a:lnSpc>
               <a:buChar char="-"/>
-              <a:defRPr b="0" spc="105" sz="1900"/>
+              <a:defRPr b="0" spc="100" sz="1900"/>
             </a:pPr>
             <a:r>
               <a:t>Forward and Backward</a:t>
             </a:r>
+            <a:endParaRPr spc="104"/>
           </a:p>
           <a:p>
             <a:pPr>
               <a:lnSpc>
                 <a:spcPct val="100000"/>
               </a:lnSpc>
-              <a:defRPr spc="105" sz="1900"/>
+              <a:defRPr spc="104" sz="1900"/>
             </a:pPr>
           </a:p>
           <a:p>
@@ -5989,7 +5990,7 @@
               <a:lnSpc>
                 <a:spcPct val="100000"/>
               </a:lnSpc>
-              <a:defRPr spc="105" sz="1900"/>
+              <a:defRPr sz="1900"/>
             </a:pPr>
             <a:r>
               <a:t>- Customise the </a:t>
@@ -6019,8 +6020,8 @@
         </p:blipFill>
         <p:spPr>
           <a:xfrm>
-            <a:off x="7833563" y="1538567"/>
-            <a:ext cx="3780865" cy="3780866"/>
+            <a:off x="7833562" y="1538567"/>
+            <a:ext cx="3780866" cy="3780867"/>
           </a:xfrm>
           <a:prstGeom prst="rect">
             <a:avLst/>
@@ -6067,7 +6068,7 @@
         <p:spPr>
           <a:xfrm>
             <a:off x="1360556" y="1459724"/>
-            <a:ext cx="7986643" cy="1200329"/>
+            <a:ext cx="7986642" cy="1200329"/>
           </a:xfrm>
           <a:prstGeom prst="rect">
             <a:avLst/>
@@ -6094,8 +6095,8 @@
         </p:nvSpPr>
         <p:spPr>
           <a:xfrm>
-            <a:off x="1354138" y="2660677"/>
-            <a:ext cx="8263497" cy="2849891"/>
+            <a:off x="1354137" y="2660676"/>
+            <a:ext cx="8263499" cy="2849892"/>
           </a:xfrm>
           <a:prstGeom prst="rect">
             <a:avLst/>
@@ -6110,93 +6111,62 @@
           <a:bodyPr/>
           <a:lstStyle/>
           <a:p>
-            <a:pPr defTabSz="457200">
+            <a:pPr marL="191411" indent="-191411" defTabSz="457200">
               <a:lnSpc>
                 <a:spcPct val="180000"/>
               </a:lnSpc>
               <a:spcBef>
                 <a:spcPts val="0"/>
               </a:spcBef>
-              <a:defRPr spc="0" sz="2000">
+              <a:buSzPct val="100000"/>
+              <a:buChar char="-"/>
+              <a:defRPr b="1" spc="0" sz="1900">
                 <a:solidFill>
                   <a:srgbClr val="535353"/>
                 </a:solidFill>
               </a:defRPr>
             </a:pPr>
             <a:r>
-              <a:t>- Slide</a:t>
-            </a:r>
-          </a:p>
-          <a:p>
-            <a:pPr defTabSz="457200">
+              <a:t>Animations</a:t>
+            </a:r>
+          </a:p>
+          <a:p>
+            <a:pPr lvl="1" marL="572411" indent="-191411">
               <a:lnSpc>
-                <a:spcPct val="180000"/>
+                <a:spcPct val="310000"/>
               </a:lnSpc>
               <a:spcBef>
                 <a:spcPts val="0"/>
               </a:spcBef>
-              <a:defRPr spc="0" sz="2000">
+              <a:buChar char="-"/>
+              <a:defRPr b="0" sz="1900">
                 <a:solidFill>
                   <a:srgbClr val="535353"/>
                 </a:solidFill>
               </a:defRPr>
             </a:pPr>
             <a:r>
-              <a:t>- Fade</a:t>
-            </a:r>
-          </a:p>
-          <a:p>
-            <a:pPr defTabSz="457200">
+              <a:t>Slide, Fade, Scale, Size, Rotation</a:t>
+            </a:r>
+          </a:p>
+          <a:p>
+            <a:pPr marL="191411" indent="-191411" defTabSz="457200">
               <a:lnSpc>
-                <a:spcPct val="180000"/>
+                <a:spcPct val="310000"/>
               </a:lnSpc>
               <a:spcBef>
                 <a:spcPts val="0"/>
               </a:spcBef>
-              <a:defRPr spc="0" sz="2000">
+              <a:buSzPct val="100000"/>
+              <a:buChar char="-"/>
+              <a:defRPr b="1" spc="0" sz="1900">
                 <a:solidFill>
                   <a:srgbClr val="535353"/>
                 </a:solidFill>
               </a:defRPr>
             </a:pPr>
             <a:r>
-              <a:t>- Scale</a:t>
-            </a:r>
-          </a:p>
-          <a:p>
-            <a:pPr defTabSz="457200">
-              <a:lnSpc>
-                <a:spcPct val="180000"/>
-              </a:lnSpc>
-              <a:spcBef>
-                <a:spcPts val="0"/>
-              </a:spcBef>
-              <a:defRPr spc="0" sz="2000">
-                <a:solidFill>
-                  <a:srgbClr val="535353"/>
-                </a:solidFill>
-              </a:defRPr>
-            </a:pPr>
-            <a:r>
-              <a:t>- Size</a:t>
-            </a:r>
-          </a:p>
-          <a:p>
-            <a:pPr defTabSz="457200">
-              <a:lnSpc>
-                <a:spcPct val="180000"/>
-              </a:lnSpc>
-              <a:spcBef>
-                <a:spcPts val="0"/>
-              </a:spcBef>
-              <a:defRPr spc="0" sz="2000">
-                <a:solidFill>
-                  <a:srgbClr val="535353"/>
-                </a:solidFill>
-              </a:defRPr>
-            </a:pPr>
-            <a:r>
-              <a:t>- Rotation</a:t>
+              <a:t>Animation Curve</a:t>
             </a:r>
           </a:p>
         </p:txBody>
@@ -6219,8 +6189,8 @@
         </p:blipFill>
         <p:spPr>
           <a:xfrm>
-            <a:off x="6838050" y="2494421"/>
-            <a:ext cx="4784731" cy="3182403"/>
+            <a:off x="6838050" y="2494420"/>
+            <a:ext cx="4784731" cy="3182405"/>
           </a:xfrm>
           <a:prstGeom prst="rect">
             <a:avLst/>
@@ -6266,8 +6236,8 @@
         </p:nvSpPr>
         <p:spPr>
           <a:xfrm>
-            <a:off x="1360556" y="1459723"/>
-            <a:ext cx="7986644" cy="724808"/>
+            <a:off x="1360555" y="1459723"/>
+            <a:ext cx="7986646" cy="724809"/>
           </a:xfrm>
           <a:prstGeom prst="rect">
             <a:avLst/>
@@ -6295,7 +6265,7 @@
         <p:spPr>
           <a:xfrm>
             <a:off x="1354138" y="2795477"/>
-            <a:ext cx="5685722" cy="2771244"/>
+            <a:ext cx="5685722" cy="2771245"/>
           </a:xfrm>
           <a:prstGeom prst="rect">
             <a:avLst/>
@@ -6310,7 +6280,7 @@
           <a:bodyPr/>
           <a:lstStyle/>
           <a:p>
-            <a:pPr marL="172270" indent="-172270">
+            <a:pPr marL="172269" indent="-172269">
               <a:lnSpc>
                 <a:spcPct val="320000"/>
               </a:lnSpc>
@@ -6324,6 +6294,7 @@
               <a:rPr b="1"/>
               <a:t>PageRoute</a:t>
             </a:r>
+            <a:endParaRPr b="1"/>
           </a:p>
           <a:p>
             <a:pPr>
@@ -6359,8 +6330,8 @@
         </p:blipFill>
         <p:spPr>
           <a:xfrm>
-            <a:off x="6898980" y="1652421"/>
-            <a:ext cx="4732503" cy="3553158"/>
+            <a:off x="6898979" y="1652421"/>
+            <a:ext cx="4732504" cy="3553158"/>
           </a:xfrm>
           <a:prstGeom prst="rect">
             <a:avLst/>
@@ -6407,7 +6378,7 @@
         <p:spPr>
           <a:xfrm>
             <a:off x="1360556" y="1459724"/>
-            <a:ext cx="7986643" cy="1200329"/>
+            <a:ext cx="7986642" cy="1200329"/>
           </a:xfrm>
           <a:prstGeom prst="rect">
             <a:avLst/>
@@ -6434,8 +6405,8 @@
         </p:nvSpPr>
         <p:spPr>
           <a:xfrm>
-            <a:off x="1354138" y="2851630"/>
-            <a:ext cx="8263497" cy="2658938"/>
+            <a:off x="1354137" y="2851629"/>
+            <a:ext cx="8263499" cy="2658940"/>
           </a:xfrm>
           <a:prstGeom prst="rect">
             <a:avLst/>
@@ -6521,8 +6492,8 @@
         </p:blipFill>
         <p:spPr>
           <a:xfrm>
-            <a:off x="8028392" y="1144803"/>
-            <a:ext cx="3579544" cy="4568394"/>
+            <a:off x="8028392" y="1144802"/>
+            <a:ext cx="3579545" cy="4568396"/>
           </a:xfrm>
           <a:prstGeom prst="rect">
             <a:avLst/>
@@ -6569,7 +6540,7 @@
         <p:spPr>
           <a:xfrm>
             <a:off x="1360556" y="1459724"/>
-            <a:ext cx="7986643" cy="1200329"/>
+            <a:ext cx="7986642" cy="1200329"/>
           </a:xfrm>
           <a:prstGeom prst="rect">
             <a:avLst/>
@@ -6596,8 +6567,8 @@
         </p:nvSpPr>
         <p:spPr>
           <a:xfrm>
-            <a:off x="1354138" y="2851630"/>
-            <a:ext cx="5239076" cy="2658938"/>
+            <a:off x="1354138" y="2851629"/>
+            <a:ext cx="5239076" cy="2658940"/>
           </a:xfrm>
           <a:prstGeom prst="rect">
             <a:avLst/>
@@ -6686,8 +6657,8 @@
         </p:blipFill>
         <p:spPr>
           <a:xfrm>
-            <a:off x="8106348" y="2480241"/>
-            <a:ext cx="3349004" cy="3148864"/>
+            <a:off x="8106347" y="2480241"/>
+            <a:ext cx="3349005" cy="3148865"/>
           </a:xfrm>
           <a:prstGeom prst="rect">
             <a:avLst/>
@@ -6749,9 +6720,9 @@
     </a:clrScheme>
     <a:fontScheme name="test master">
       <a:majorFont>
-        <a:latin typeface="Charter Roman"/>
-        <a:ea typeface="Charter Roman"/>
-        <a:cs typeface="Charter Roman"/>
+        <a:latin typeface="Helvetica"/>
+        <a:ea typeface="Helvetica"/>
+        <a:cs typeface="Helvetica"/>
       </a:majorFont>
       <a:minorFont>
         <a:latin typeface="Calibri"/>
@@ -6899,17 +6870,17 @@
         <a:solidFill>
           <a:srgbClr val="FFFFFF"/>
         </a:solidFill>
-        <a:ln w="12700" cap="flat">
+        <a:ln w="25400" cap="flat">
           <a:solidFill>
             <a:schemeClr val="accent1"/>
           </a:solidFill>
           <a:prstDash val="solid"/>
-          <a:miter lim="800000"/>
+          <a:round/>
         </a:ln>
         <a:effectLst/>
         <a:sp3d/>
       </a:spPr>
-      <a:bodyPr rot="0" spcFirstLastPara="1" vertOverflow="overflow" horzOverflow="overflow" vert="horz" wrap="square" lIns="45719" tIns="45719" rIns="45719" bIns="45719" numCol="1" spcCol="38100" rtlCol="0" anchor="ctr" upright="0">
+      <a:bodyPr rot="0" spcFirstLastPara="1" vertOverflow="overflow" horzOverflow="overflow" vert="horz" wrap="square" lIns="45718" tIns="45718" rIns="45718" bIns="45718" numCol="1" spcCol="38100" rtlCol="0" anchor="ctr" upright="0">
         <a:spAutoFit/>
       </a:bodyPr>
       <a:lstStyle>
@@ -7188,12 +7159,12 @@
     <a:lnDef>
       <a:spPr>
         <a:noFill/>
-        <a:ln w="12700" cap="flat">
+        <a:ln w="25400" cap="flat">
           <a:solidFill>
             <a:schemeClr val="accent1"/>
           </a:solidFill>
           <a:prstDash val="solid"/>
-          <a:miter lim="800000"/>
+          <a:round/>
         </a:ln>
         <a:effectLst/>
         <a:sp3d/>
@@ -7480,7 +7451,7 @@
         <a:effectLst/>
         <a:sp3d/>
       </a:spPr>
-      <a:bodyPr rot="0" spcFirstLastPara="1" vertOverflow="overflow" horzOverflow="overflow" vert="horz" wrap="square" lIns="45719" tIns="45719" rIns="45719" bIns="45719" numCol="1" spcCol="38100" rtlCol="0" anchor="t" upright="0">
+      <a:bodyPr rot="0" spcFirstLastPara="1" vertOverflow="overflow" horzOverflow="overflow" vert="horz" wrap="square" lIns="45718" tIns="45718" rIns="45718" bIns="45718" numCol="1" spcCol="38100" rtlCol="0" anchor="t" upright="0">
         <a:spAutoFit/>
       </a:bodyPr>
       <a:lstStyle>
@@ -7803,9 +7774,9 @@
     </a:clrScheme>
     <a:fontScheme name="test master">
       <a:majorFont>
-        <a:latin typeface="Charter Roman"/>
-        <a:ea typeface="Charter Roman"/>
-        <a:cs typeface="Charter Roman"/>
+        <a:latin typeface="Helvetica"/>
+        <a:ea typeface="Helvetica"/>
+        <a:cs typeface="Helvetica"/>
       </a:majorFont>
       <a:minorFont>
         <a:latin typeface="Calibri"/>
@@ -7953,17 +7924,17 @@
         <a:solidFill>
           <a:srgbClr val="FFFFFF"/>
         </a:solidFill>
-        <a:ln w="12700" cap="flat">
+        <a:ln w="25400" cap="flat">
           <a:solidFill>
             <a:schemeClr val="accent1"/>
           </a:solidFill>
           <a:prstDash val="solid"/>
-          <a:miter lim="800000"/>
+          <a:round/>
         </a:ln>
         <a:effectLst/>
         <a:sp3d/>
       </a:spPr>
-      <a:bodyPr rot="0" spcFirstLastPara="1" vertOverflow="overflow" horzOverflow="overflow" vert="horz" wrap="square" lIns="45719" tIns="45719" rIns="45719" bIns="45719" numCol="1" spcCol="38100" rtlCol="0" anchor="ctr" upright="0">
+      <a:bodyPr rot="0" spcFirstLastPara="1" vertOverflow="overflow" horzOverflow="overflow" vert="horz" wrap="square" lIns="45718" tIns="45718" rIns="45718" bIns="45718" numCol="1" spcCol="38100" rtlCol="0" anchor="ctr" upright="0">
         <a:spAutoFit/>
       </a:bodyPr>
       <a:lstStyle>
@@ -8242,12 +8213,12 @@
     <a:lnDef>
       <a:spPr>
         <a:noFill/>
-        <a:ln w="12700" cap="flat">
+        <a:ln w="25400" cap="flat">
           <a:solidFill>
             <a:schemeClr val="accent1"/>
           </a:solidFill>
           <a:prstDash val="solid"/>
-          <a:miter lim="800000"/>
+          <a:round/>
         </a:ln>
         <a:effectLst/>
         <a:sp3d/>
@@ -8534,7 +8505,7 @@
         <a:effectLst/>
         <a:sp3d/>
       </a:spPr>
-      <a:bodyPr rot="0" spcFirstLastPara="1" vertOverflow="overflow" horzOverflow="overflow" vert="horz" wrap="square" lIns="45719" tIns="45719" rIns="45719" bIns="45719" numCol="1" spcCol="38100" rtlCol="0" anchor="t" upright="0">
+      <a:bodyPr rot="0" spcFirstLastPara="1" vertOverflow="overflow" horzOverflow="overflow" vert="horz" wrap="square" lIns="45718" tIns="45718" rIns="45718" bIns="45718" numCol="1" spcCol="38100" rtlCol="0" anchor="t" upright="0">
         <a:spAutoFit/>
       </a:bodyPr>
       <a:lstStyle>

</xml_diff>